<commit_message>
profile, properties und file inclusion bzw exclusion
</commit_message>
<xml_diff>
--- a/MAVEN.pptx
+++ b/MAVEN.pptx
@@ -6,17 +6,18 @@
   </p:sldMasterIdLst>
   <p:sldIdLst>
     <p:sldId id="256" r:id="rId2"/>
-    <p:sldId id="257" r:id="rId3"/>
-    <p:sldId id="260" r:id="rId4"/>
-    <p:sldId id="261" r:id="rId5"/>
-    <p:sldId id="262" r:id="rId6"/>
-    <p:sldId id="259" r:id="rId7"/>
-    <p:sldId id="258" r:id="rId8"/>
-    <p:sldId id="263" r:id="rId9"/>
-    <p:sldId id="264" r:id="rId10"/>
-    <p:sldId id="266" r:id="rId11"/>
-    <p:sldId id="265" r:id="rId12"/>
-    <p:sldId id="267" r:id="rId13"/>
+    <p:sldId id="268" r:id="rId3"/>
+    <p:sldId id="272" r:id="rId4"/>
+    <p:sldId id="259" r:id="rId5"/>
+    <p:sldId id="258" r:id="rId6"/>
+    <p:sldId id="273" r:id="rId7"/>
+    <p:sldId id="264" r:id="rId8"/>
+    <p:sldId id="266" r:id="rId9"/>
+    <p:sldId id="265" r:id="rId10"/>
+    <p:sldId id="270" r:id="rId11"/>
+    <p:sldId id="267" r:id="rId12"/>
+    <p:sldId id="271" r:id="rId13"/>
+    <p:sldId id="263" r:id="rId14"/>
   </p:sldIdLst>
   <p:sldSz cx="12192000" cy="6858000"/>
   <p:notesSz cx="6858000" cy="9144000"/>
@@ -115,6 +116,11 @@
       </a:defRPr>
     </a:lvl9pPr>
   </p:defaultTextStyle>
+  <p:extLst>
+    <p:ext uri="{EFAFB233-063F-42B5-8137-9DF3F51BA10A}">
+      <p15:sldGuideLst xmlns:p15="http://schemas.microsoft.com/office/powerpoint/2012/main"/>
+    </p:ext>
+  </p:extLst>
 </p:presentation>
 </file>
 
@@ -265,7 +271,7 @@
           <a:p>
             <a:fld id="{E3F48BE3-59E6-1E40-B15F-601F7EACC3FE}" type="datetimeFigureOut">
               <a:rPr lang="de-DE" smtClean="0"/>
-              <a:t>02.10.19</a:t>
+              <a:t>04.10.19</a:t>
             </a:fld>
             <a:endParaRPr lang="de-DE"/>
           </a:p>
@@ -463,7 +469,7 @@
           <a:p>
             <a:fld id="{E3F48BE3-59E6-1E40-B15F-601F7EACC3FE}" type="datetimeFigureOut">
               <a:rPr lang="de-DE" smtClean="0"/>
-              <a:t>02.10.19</a:t>
+              <a:t>04.10.19</a:t>
             </a:fld>
             <a:endParaRPr lang="de-DE"/>
           </a:p>
@@ -671,7 +677,7 @@
           <a:p>
             <a:fld id="{E3F48BE3-59E6-1E40-B15F-601F7EACC3FE}" type="datetimeFigureOut">
               <a:rPr lang="de-DE" smtClean="0"/>
-              <a:t>02.10.19</a:t>
+              <a:t>04.10.19</a:t>
             </a:fld>
             <a:endParaRPr lang="de-DE"/>
           </a:p>
@@ -869,7 +875,7 @@
           <a:p>
             <a:fld id="{E3F48BE3-59E6-1E40-B15F-601F7EACC3FE}" type="datetimeFigureOut">
               <a:rPr lang="de-DE" smtClean="0"/>
-              <a:t>02.10.19</a:t>
+              <a:t>04.10.19</a:t>
             </a:fld>
             <a:endParaRPr lang="de-DE"/>
           </a:p>
@@ -1144,7 +1150,7 @@
           <a:p>
             <a:fld id="{E3F48BE3-59E6-1E40-B15F-601F7EACC3FE}" type="datetimeFigureOut">
               <a:rPr lang="de-DE" smtClean="0"/>
-              <a:t>02.10.19</a:t>
+              <a:t>04.10.19</a:t>
             </a:fld>
             <a:endParaRPr lang="de-DE"/>
           </a:p>
@@ -1409,7 +1415,7 @@
           <a:p>
             <a:fld id="{E3F48BE3-59E6-1E40-B15F-601F7EACC3FE}" type="datetimeFigureOut">
               <a:rPr lang="de-DE" smtClean="0"/>
-              <a:t>02.10.19</a:t>
+              <a:t>04.10.19</a:t>
             </a:fld>
             <a:endParaRPr lang="de-DE"/>
           </a:p>
@@ -1821,7 +1827,7 @@
           <a:p>
             <a:fld id="{E3F48BE3-59E6-1E40-B15F-601F7EACC3FE}" type="datetimeFigureOut">
               <a:rPr lang="de-DE" smtClean="0"/>
-              <a:t>02.10.19</a:t>
+              <a:t>04.10.19</a:t>
             </a:fld>
             <a:endParaRPr lang="de-DE"/>
           </a:p>
@@ -1962,7 +1968,7 @@
           <a:p>
             <a:fld id="{E3F48BE3-59E6-1E40-B15F-601F7EACC3FE}" type="datetimeFigureOut">
               <a:rPr lang="de-DE" smtClean="0"/>
-              <a:t>02.10.19</a:t>
+              <a:t>04.10.19</a:t>
             </a:fld>
             <a:endParaRPr lang="de-DE"/>
           </a:p>
@@ -2075,7 +2081,7 @@
           <a:p>
             <a:fld id="{E3F48BE3-59E6-1E40-B15F-601F7EACC3FE}" type="datetimeFigureOut">
               <a:rPr lang="de-DE" smtClean="0"/>
-              <a:t>02.10.19</a:t>
+              <a:t>04.10.19</a:t>
             </a:fld>
             <a:endParaRPr lang="de-DE"/>
           </a:p>
@@ -2386,7 +2392,7 @@
           <a:p>
             <a:fld id="{E3F48BE3-59E6-1E40-B15F-601F7EACC3FE}" type="datetimeFigureOut">
               <a:rPr lang="de-DE" smtClean="0"/>
-              <a:t>02.10.19</a:t>
+              <a:t>04.10.19</a:t>
             </a:fld>
             <a:endParaRPr lang="de-DE"/>
           </a:p>
@@ -2674,7 +2680,7 @@
           <a:p>
             <a:fld id="{E3F48BE3-59E6-1E40-B15F-601F7EACC3FE}" type="datetimeFigureOut">
               <a:rPr lang="de-DE" smtClean="0"/>
-              <a:t>02.10.19</a:t>
+              <a:t>04.10.19</a:t>
             </a:fld>
             <a:endParaRPr lang="de-DE"/>
           </a:p>
@@ -2915,7 +2921,7 @@
           <a:p>
             <a:fld id="{E3F48BE3-59E6-1E40-B15F-601F7EACC3FE}" type="datetimeFigureOut">
               <a:rPr lang="de-DE" smtClean="0"/>
-              <a:t>02.10.19</a:t>
+              <a:t>04.10.19</a:t>
             </a:fld>
             <a:endParaRPr lang="de-DE"/>
           </a:p>
@@ -3420,10 +3426,35 @@
       </p:grpSpPr>
       <p:sp>
         <p:nvSpPr>
+          <p:cNvPr id="2" name="Titel 1">
+            <a:extLst>
+              <a:ext uri="{FF2B5EF4-FFF2-40B4-BE49-F238E27FC236}">
+                <a16:creationId xmlns:a16="http://schemas.microsoft.com/office/drawing/2014/main" id="{58289D18-201D-F643-AD5B-5DF5285241EE}"/>
+              </a:ext>
+            </a:extLst>
+          </p:cNvPr>
+          <p:cNvSpPr>
+            <a:spLocks noGrp="1"/>
+          </p:cNvSpPr>
+          <p:nvPr>
+            <p:ph type="title"/>
+          </p:nvPr>
+        </p:nvSpPr>
+        <p:spPr/>
+        <p:txBody>
+          <a:bodyPr/>
+          <a:lstStyle/>
+          <a:p>
+            <a:endParaRPr lang="de-DE"/>
+          </a:p>
+        </p:txBody>
+      </p:sp>
+      <p:sp>
+        <p:nvSpPr>
           <p:cNvPr id="3" name="Inhaltsplatzhalter 2">
             <a:extLst>
               <a:ext uri="{FF2B5EF4-FFF2-40B4-BE49-F238E27FC236}">
-                <a16:creationId xmlns:a16="http://schemas.microsoft.com/office/drawing/2014/main" id="{B3B159BF-BD0B-9746-9169-7A2A945971A5}"/>
+                <a16:creationId xmlns:a16="http://schemas.microsoft.com/office/drawing/2014/main" id="{039D8BD5-1C9C-BE4A-8181-D6C0CBDBA143}"/>
               </a:ext>
             </a:extLst>
           </p:cNvPr>
@@ -3434,69 +3465,30 @@
             <p:ph idx="1"/>
           </p:nvPr>
         </p:nvSpPr>
-        <p:spPr>
-          <a:xfrm>
-            <a:off x="838200" y="1016000"/>
-            <a:ext cx="10515600" cy="5160963"/>
-          </a:xfrm>
-        </p:spPr>
-        <p:txBody>
-          <a:bodyPr/>
-          <a:lstStyle/>
-          <a:p>
-            <a:pPr marL="0" indent="0">
-              <a:buNone/>
-            </a:pPr>
-            <a:r>
-              <a:rPr lang="de-DE" b="1" dirty="0" err="1"/>
-              <a:t>Scope</a:t>
-            </a:r>
-            <a:r>
-              <a:rPr lang="de-DE" b="1" dirty="0"/>
+        <p:spPr/>
+        <p:txBody>
+          <a:bodyPr/>
+          <a:lstStyle/>
+          <a:p>
+            <a:r>
+              <a:rPr lang="de-DE" dirty="0" err="1"/>
+              <a:t>From</a:t>
+            </a:r>
+            <a:r>
+              <a:rPr lang="de-DE" dirty="0"/>
               <a:t> </a:t>
             </a:r>
-          </a:p>
-          <a:p>
-            <a:pPr marL="0" indent="0">
-              <a:buNone/>
-            </a:pPr>
-            <a:r>
-              <a:rPr lang="de-DE" i="1" dirty="0"/>
-              <a:t>beschränkt die </a:t>
-            </a:r>
-            <a:r>
-              <a:rPr lang="de-DE" i="1" dirty="0" err="1"/>
-              <a:t>präsenz</a:t>
-            </a:r>
-            <a:r>
-              <a:rPr lang="de-DE" i="1" dirty="0"/>
-              <a:t> eines </a:t>
-            </a:r>
-            <a:r>
-              <a:rPr lang="de-DE" i="1" dirty="0" err="1"/>
-              <a:t>artifact</a:t>
-            </a:r>
-            <a:r>
-              <a:rPr lang="de-DE" i="1" dirty="0"/>
+            <a:r>
+              <a:rPr lang="de-DE" dirty="0" err="1"/>
+              <a:t>pom</a:t>
+            </a:r>
+            <a:r>
+              <a:rPr lang="de-DE" dirty="0"/>
               <a:t> </a:t>
             </a:r>
-          </a:p>
-          <a:p>
-            <a:r>
-              <a:rPr lang="de-DE" dirty="0"/>
-              <a:t>Test = </a:t>
-            </a:r>
-            <a:r>
-              <a:rPr lang="de-DE" dirty="0" err="1"/>
-              <a:t>artifact.jar</a:t>
-            </a:r>
-            <a:r>
-              <a:rPr lang="de-DE" dirty="0"/>
-              <a:t> nur während </a:t>
-            </a:r>
-            <a:r>
-              <a:rPr lang="de-DE" dirty="0" err="1"/>
-              <a:t>test</a:t>
+            <a:r>
+              <a:rPr lang="de-DE" dirty="0" err="1"/>
+              <a:t>to</a:t>
             </a:r>
             <a:r>
               <a:rPr lang="de-DE" dirty="0"/>
@@ -3504,30 +3496,26 @@
             </a:r>
             <a:r>
               <a:rPr lang="de-DE" dirty="0" err="1"/>
-              <a:t>phase</a:t>
-            </a:r>
-            <a:r>
-              <a:rPr lang="de-DE" dirty="0"/>
-              <a:t> präsent aber in </a:t>
-            </a:r>
-            <a:r>
-              <a:rPr lang="de-DE" dirty="0" err="1"/>
-              <a:t>deploy</a:t>
-            </a:r>
-            <a:r>
-              <a:rPr lang="de-DE" dirty="0"/>
-              <a:t> ober was auch nicht mehr in </a:t>
-            </a:r>
-            <a:r>
-              <a:rPr lang="de-DE" dirty="0" err="1"/>
-              <a:t>binary</a:t>
-            </a:r>
-            <a:endParaRPr lang="de-DE" dirty="0"/>
-          </a:p>
-          <a:p>
-            <a:r>
-              <a:rPr lang="de-DE" dirty="0" err="1"/>
-              <a:t>Provided</a:t>
+              <a:t>java</a:t>
+            </a:r>
+            <a:r>
+              <a:rPr lang="de-DE" dirty="0"/>
+              <a:t> </a:t>
+            </a:r>
+            <a:r>
+              <a:rPr lang="de-DE" dirty="0" err="1"/>
+              <a:t>code</a:t>
+            </a:r>
+            <a:r>
+              <a:rPr lang="de-DE" dirty="0"/>
+              <a:t> übertragen</a:t>
+            </a:r>
+          </a:p>
+          <a:p>
+            <a:pPr lvl="1"/>
+            <a:r>
+              <a:rPr lang="de-DE" dirty="0" err="1"/>
+              <a:t>Pom</a:t>
             </a:r>
             <a:r>
               <a:rPr lang="de-DE" dirty="0"/>
@@ -3535,68 +3523,50 @@
             </a:r>
             <a:r>
               <a:rPr lang="de-DE" dirty="0" err="1"/>
-              <a:t>artifact.jar</a:t>
-            </a:r>
-            <a:r>
-              <a:rPr lang="de-DE" dirty="0"/>
-              <a:t> nur während </a:t>
-            </a:r>
-            <a:r>
-              <a:rPr lang="de-DE" dirty="0" err="1"/>
-              <a:t>compile</a:t>
-            </a:r>
-            <a:r>
-              <a:rPr lang="de-DE" dirty="0"/>
-              <a:t> und </a:t>
-            </a:r>
-            <a:r>
-              <a:rPr lang="de-DE" dirty="0" err="1"/>
-              <a:t>test</a:t>
+              <a:t>conkrete</a:t>
+            </a:r>
+            <a:r>
+              <a:rPr lang="de-DE" dirty="0"/>
+              <a:t> werte</a:t>
+            </a:r>
+          </a:p>
+          <a:p>
+            <a:pPr lvl="1"/>
+            <a:r>
+              <a:rPr lang="de-DE" dirty="0"/>
+              <a:t>Properties </a:t>
+            </a:r>
+            <a:r>
+              <a:rPr lang="de-DE" dirty="0" err="1"/>
+              <a:t>place</a:t>
+            </a:r>
+            <a:r>
+              <a:rPr lang="de-DE" dirty="0"/>
+              <a:t> holder eingeben</a:t>
+            </a:r>
+          </a:p>
+          <a:p>
+            <a:pPr lvl="1"/>
+            <a:r>
+              <a:rPr lang="de-DE" dirty="0" err="1"/>
+              <a:t>Javacode</a:t>
+            </a:r>
+            <a:r>
+              <a:rPr lang="de-DE" dirty="0"/>
+              <a:t> liest die </a:t>
+            </a:r>
+            <a:r>
+              <a:rPr lang="de-DE" dirty="0" err="1"/>
+              <a:t>properties</a:t>
             </a:r>
             <a:r>
               <a:rPr lang="de-DE" dirty="0"/>
               <a:t> </a:t>
             </a:r>
-          </a:p>
-          <a:p>
-            <a:r>
-              <a:rPr lang="de-DE" dirty="0" err="1"/>
-              <a:t>Compile</a:t>
-            </a:r>
-            <a:r>
-              <a:rPr lang="de-DE" dirty="0"/>
-              <a:t> =  alle </a:t>
-            </a:r>
-            <a:r>
-              <a:rPr lang="de-DE" dirty="0" err="1"/>
-              <a:t>phase</a:t>
-            </a:r>
-            <a:endParaRPr lang="de-DE" dirty="0"/>
-          </a:p>
-          <a:p>
-            <a:r>
-              <a:rPr lang="de-DE" dirty="0" err="1"/>
-              <a:t>Runtime</a:t>
-            </a:r>
-            <a:r>
-              <a:rPr lang="de-DE" dirty="0"/>
-              <a:t> = </a:t>
-            </a:r>
-            <a:r>
-              <a:rPr lang="de-DE" dirty="0" err="1"/>
-              <a:t>test</a:t>
-            </a:r>
-            <a:r>
-              <a:rPr lang="de-DE" dirty="0"/>
-              <a:t> und </a:t>
-            </a:r>
-            <a:r>
-              <a:rPr lang="de-DE" dirty="0" err="1"/>
-              <a:t>production</a:t>
-            </a:r>
-            <a:endParaRPr lang="de-DE" dirty="0"/>
-          </a:p>
-          <a:p>
+            <a:r>
+              <a:rPr lang="de-DE" dirty="0" err="1"/>
+              <a:t>file</a:t>
+            </a:r>
             <a:endParaRPr lang="de-DE" dirty="0"/>
           </a:p>
         </p:txBody>
@@ -3604,7 +3574,7 @@
     </p:spTree>
     <p:extLst>
       <p:ext uri="{BB962C8B-B14F-4D97-AF65-F5344CB8AC3E}">
-        <p14:creationId xmlns:p14="http://schemas.microsoft.com/office/powerpoint/2010/main" val="3602108803"/>
+        <p14:creationId xmlns:p14="http://schemas.microsoft.com/office/powerpoint/2010/main" val="4208238677"/>
       </p:ext>
     </p:extLst>
   </p:cSld>
@@ -3636,7 +3606,7 @@
           <p:cNvPr id="2" name="Titel 1">
             <a:extLst>
               <a:ext uri="{FF2B5EF4-FFF2-40B4-BE49-F238E27FC236}">
-                <a16:creationId xmlns:a16="http://schemas.microsoft.com/office/drawing/2014/main" id="{B0FEF358-39DC-1347-8A0D-52157BA51A65}"/>
+                <a16:creationId xmlns:a16="http://schemas.microsoft.com/office/drawing/2014/main" id="{D7B7ED5C-5142-1948-AAFF-CD00C84CA7AE}"/>
               </a:ext>
             </a:extLst>
           </p:cNvPr>
@@ -3652,7 +3622,11 @@
           <a:bodyPr/>
           <a:lstStyle/>
           <a:p>
-            <a:endParaRPr lang="de-DE"/>
+            <a:r>
+              <a:rPr lang="de-DE" b="1" dirty="0" err="1"/>
+              <a:t>Plugins</a:t>
+            </a:r>
+            <a:endParaRPr lang="de-DE" b="1" dirty="0"/>
           </a:p>
         </p:txBody>
       </p:sp>
@@ -3661,7 +3635,7 @@
           <p:cNvPr id="3" name="Inhaltsplatzhalter 2">
             <a:extLst>
               <a:ext uri="{FF2B5EF4-FFF2-40B4-BE49-F238E27FC236}">
-                <a16:creationId xmlns:a16="http://schemas.microsoft.com/office/drawing/2014/main" id="{9EC6270F-7ED1-744A-8116-9FCE5D524585}"/>
+                <a16:creationId xmlns:a16="http://schemas.microsoft.com/office/drawing/2014/main" id="{54CF4B03-CCF9-5A45-B2BB-D1BE3663B6BF}"/>
               </a:ext>
             </a:extLst>
           </p:cNvPr>
@@ -3677,92 +3651,42 @@
           <a:bodyPr/>
           <a:lstStyle/>
           <a:p>
-            <a:r>
-              <a:rPr lang="de-DE" dirty="0"/>
-              <a:t>Wenn </a:t>
-            </a:r>
-            <a:r>
-              <a:rPr lang="de-DE" dirty="0" err="1"/>
-              <a:t>artifact</a:t>
-            </a:r>
-            <a:r>
-              <a:rPr lang="de-DE" dirty="0"/>
-              <a:t> im </a:t>
-            </a:r>
-            <a:r>
-              <a:rPr lang="de-DE" dirty="0" err="1"/>
-              <a:t>pom</a:t>
-            </a:r>
-            <a:r>
-              <a:rPr lang="de-DE" dirty="0"/>
-              <a:t> </a:t>
-            </a:r>
-            <a:r>
-              <a:rPr lang="de-DE" dirty="0" err="1"/>
-              <a:t>problem</a:t>
-            </a:r>
-            <a:r>
-              <a:rPr lang="de-DE" dirty="0"/>
-              <a:t> hat =&gt; in –m2 </a:t>
-            </a:r>
-            <a:r>
-              <a:rPr lang="de-DE" dirty="0" err="1"/>
-              <a:t>shauen</a:t>
-            </a:r>
-            <a:r>
-              <a:rPr lang="de-DE" dirty="0"/>
-              <a:t> ob alles ok </a:t>
-            </a:r>
-            <a:r>
-              <a:rPr lang="de-DE" dirty="0" err="1"/>
-              <a:t>is</a:t>
-            </a:r>
             <a:endParaRPr lang="de-DE" dirty="0"/>
           </a:p>
           <a:p>
             <a:r>
               <a:rPr lang="de-DE" dirty="0"/>
-              <a:t>Wenn in .m2 etwas fehlt dann komplett </a:t>
-            </a:r>
-            <a:r>
-              <a:rPr lang="de-DE" dirty="0" err="1"/>
-              <a:t>artifact</a:t>
-            </a:r>
-            <a:r>
-              <a:rPr lang="de-DE" dirty="0"/>
-              <a:t> und sein </a:t>
-            </a:r>
-            <a:r>
-              <a:rPr lang="de-DE" dirty="0" err="1"/>
-              <a:t>ordner</a:t>
-            </a:r>
-            <a:r>
-              <a:rPr lang="de-DE" dirty="0"/>
-              <a:t> löschen und mit </a:t>
-            </a:r>
-            <a:r>
-              <a:rPr lang="de-DE" dirty="0" err="1"/>
-              <a:t>mvn</a:t>
-            </a:r>
-            <a:r>
-              <a:rPr lang="de-DE" dirty="0"/>
-              <a:t> </a:t>
-            </a:r>
-            <a:r>
-              <a:rPr lang="de-DE" dirty="0" err="1"/>
-              <a:t>artifact</a:t>
-            </a:r>
-            <a:r>
-              <a:rPr lang="de-DE" dirty="0"/>
-              <a:t> von </a:t>
-            </a:r>
-            <a:r>
-              <a:rPr lang="de-DE" dirty="0" err="1"/>
-              <a:t>nexus</a:t>
-            </a:r>
-            <a:r>
-              <a:rPr lang="de-DE" dirty="0"/>
-              <a:t> erneut holen</a:t>
+              <a:t>Mach mehr schritte als </a:t>
+            </a:r>
+            <a:r>
+              <a:rPr lang="de-DE" dirty="0" err="1"/>
+              <a:t>lifecycle</a:t>
+            </a:r>
+            <a:r>
+              <a:rPr lang="de-DE" dirty="0"/>
+              <a:t>.</a:t>
+            </a:r>
+          </a:p>
+          <a:p>
+            <a:r>
+              <a:rPr lang="de-DE" dirty="0"/>
+              <a:t>Es sind </a:t>
+            </a:r>
+            <a:r>
+              <a:rPr lang="de-DE" dirty="0" err="1"/>
+              <a:t>customized</a:t>
+            </a:r>
+            <a:r>
+              <a:rPr lang="de-DE" dirty="0"/>
+              <a:t> schritte um </a:t>
+            </a:r>
+            <a:r>
+              <a:rPr lang="de-DE" dirty="0" err="1"/>
+              <a:t>Lifecycle</a:t>
+            </a:r>
+            <a:r>
+              <a:rPr lang="de-DE" dirty="0"/>
+              <a:t> zu erweitern</a:t>
             </a:r>
           </a:p>
           <a:p>
@@ -3773,7 +3697,7 @@
     </p:spTree>
     <p:extLst>
       <p:ext uri="{BB962C8B-B14F-4D97-AF65-F5344CB8AC3E}">
-        <p14:creationId xmlns:p14="http://schemas.microsoft.com/office/powerpoint/2010/main" val="3487494916"/>
+        <p14:creationId xmlns:p14="http://schemas.microsoft.com/office/powerpoint/2010/main" val="936063113"/>
       </p:ext>
     </p:extLst>
   </p:cSld>
@@ -3805,7 +3729,7 @@
           <p:cNvPr id="2" name="Titel 1">
             <a:extLst>
               <a:ext uri="{FF2B5EF4-FFF2-40B4-BE49-F238E27FC236}">
-                <a16:creationId xmlns:a16="http://schemas.microsoft.com/office/drawing/2014/main" id="{D7B7ED5C-5142-1948-AAFF-CD00C84CA7AE}"/>
+                <a16:creationId xmlns:a16="http://schemas.microsoft.com/office/drawing/2014/main" id="{D5A11F6E-BEAF-A545-A018-633A11785A8C}"/>
               </a:ext>
             </a:extLst>
           </p:cNvPr>
@@ -3822,10 +3746,10 @@
           <a:lstStyle/>
           <a:p>
             <a:r>
-              <a:rPr lang="de-DE" dirty="0" err="1"/>
-              <a:t>Plugins</a:t>
-            </a:r>
-            <a:endParaRPr lang="de-DE" dirty="0"/>
+              <a:rPr lang="de-DE" b="1" dirty="0" err="1"/>
+              <a:t>Archetypes</a:t>
+            </a:r>
+            <a:endParaRPr lang="de-DE" b="1" dirty="0"/>
           </a:p>
         </p:txBody>
       </p:sp>
@@ -3834,7 +3758,7 @@
           <p:cNvPr id="3" name="Inhaltsplatzhalter 2">
             <a:extLst>
               <a:ext uri="{FF2B5EF4-FFF2-40B4-BE49-F238E27FC236}">
-                <a16:creationId xmlns:a16="http://schemas.microsoft.com/office/drawing/2014/main" id="{54CF4B03-CCF9-5A45-B2BB-D1BE3663B6BF}"/>
+                <a16:creationId xmlns:a16="http://schemas.microsoft.com/office/drawing/2014/main" id="{C17779B5-DB98-CC44-87AE-F96C508E7BE8}"/>
               </a:ext>
             </a:extLst>
           </p:cNvPr>
@@ -3850,45 +3774,18 @@
           <a:bodyPr/>
           <a:lstStyle/>
           <a:p>
-            <a:endParaRPr lang="de-DE" dirty="0"/>
-          </a:p>
-          <a:p>
-            <a:r>
-              <a:rPr lang="de-DE" dirty="0"/>
-              <a:t>Mach mehr schritte als </a:t>
-            </a:r>
-            <a:r>
-              <a:rPr lang="de-DE" dirty="0" err="1"/>
-              <a:t>lifecycle</a:t>
-            </a:r>
-            <a:r>
-              <a:rPr lang="de-DE" dirty="0"/>
-              <a:t>.</a:t>
-            </a:r>
-          </a:p>
-          <a:p>
-            <a:r>
-              <a:rPr lang="de-DE" dirty="0"/>
-              <a:t>Es sind </a:t>
-            </a:r>
-            <a:r>
-              <a:rPr lang="de-DE" dirty="0" err="1"/>
-              <a:t>customized</a:t>
-            </a:r>
-            <a:r>
-              <a:rPr lang="de-DE" dirty="0"/>
-              <a:t> schritte um </a:t>
-            </a:r>
-            <a:r>
-              <a:rPr lang="de-DE" dirty="0" err="1"/>
-              <a:t>Lifecycle</a:t>
-            </a:r>
-            <a:r>
-              <a:rPr lang="de-DE" dirty="0"/>
-              <a:t> zu erweitern</a:t>
-            </a:r>
-          </a:p>
-          <a:p>
+            <a:r>
+              <a:rPr lang="de-DE" dirty="0" err="1"/>
+              <a:t>Archetypes</a:t>
+            </a:r>
+            <a:r>
+              <a:rPr lang="de-DE" dirty="0"/>
+              <a:t> = Project </a:t>
+            </a:r>
+            <a:r>
+              <a:rPr lang="de-DE" dirty="0" err="1"/>
+              <a:t>model</a:t>
+            </a:r>
             <a:endParaRPr lang="de-DE" dirty="0"/>
           </a:p>
         </p:txBody>
@@ -3896,7 +3793,167 @@
     </p:spTree>
     <p:extLst>
       <p:ext uri="{BB962C8B-B14F-4D97-AF65-F5344CB8AC3E}">
-        <p14:creationId xmlns:p14="http://schemas.microsoft.com/office/powerpoint/2010/main" val="936063113"/>
+        <p14:creationId xmlns:p14="http://schemas.microsoft.com/office/powerpoint/2010/main" val="2002166664"/>
+      </p:ext>
+    </p:extLst>
+  </p:cSld>
+  <p:clrMapOvr>
+    <a:masterClrMapping/>
+  </p:clrMapOvr>
+</p:sld>
+</file>
+
+<file path=ppt/slides/slide13.xml><?xml version="1.0" encoding="utf-8"?>
+<p:sld xmlns:a="http://schemas.openxmlformats.org/drawingml/2006/main" xmlns:r="http://schemas.openxmlformats.org/officeDocument/2006/relationships" xmlns:p="http://schemas.openxmlformats.org/presentationml/2006/main">
+  <p:cSld>
+    <p:spTree>
+      <p:nvGrpSpPr>
+        <p:cNvPr id="1" name=""/>
+        <p:cNvGrpSpPr/>
+        <p:nvPr/>
+      </p:nvGrpSpPr>
+      <p:grpSpPr>
+        <a:xfrm>
+          <a:off x="0" y="0"/>
+          <a:ext cx="0" cy="0"/>
+          <a:chOff x="0" y="0"/>
+          <a:chExt cx="0" cy="0"/>
+        </a:xfrm>
+      </p:grpSpPr>
+      <p:sp>
+        <p:nvSpPr>
+          <p:cNvPr id="2" name="Titel 1">
+            <a:extLst>
+              <a:ext uri="{FF2B5EF4-FFF2-40B4-BE49-F238E27FC236}">
+                <a16:creationId xmlns:a16="http://schemas.microsoft.com/office/drawing/2014/main" id="{1FF89E42-9F8D-2344-BDDA-F815A9B9255C}"/>
+              </a:ext>
+            </a:extLst>
+          </p:cNvPr>
+          <p:cNvSpPr>
+            <a:spLocks noGrp="1"/>
+          </p:cNvSpPr>
+          <p:nvPr>
+            <p:ph type="title"/>
+          </p:nvPr>
+        </p:nvSpPr>
+        <p:spPr/>
+        <p:txBody>
+          <a:bodyPr/>
+          <a:lstStyle/>
+          <a:p>
+            <a:r>
+              <a:rPr lang="de-DE" dirty="0"/>
+              <a:t>Hinweise</a:t>
+            </a:r>
+          </a:p>
+        </p:txBody>
+      </p:sp>
+      <p:sp>
+        <p:nvSpPr>
+          <p:cNvPr id="3" name="Inhaltsplatzhalter 2">
+            <a:extLst>
+              <a:ext uri="{FF2B5EF4-FFF2-40B4-BE49-F238E27FC236}">
+                <a16:creationId xmlns:a16="http://schemas.microsoft.com/office/drawing/2014/main" id="{BF72D7C3-63F1-734A-A673-C1319781D0C7}"/>
+              </a:ext>
+            </a:extLst>
+          </p:cNvPr>
+          <p:cNvSpPr>
+            <a:spLocks noGrp="1"/>
+          </p:cNvSpPr>
+          <p:nvPr>
+            <p:ph idx="1"/>
+          </p:nvPr>
+        </p:nvSpPr>
+        <p:spPr/>
+        <p:txBody>
+          <a:bodyPr/>
+          <a:lstStyle/>
+          <a:p>
+            <a:r>
+              <a:rPr lang="de-DE" dirty="0"/>
+              <a:t>Wenn du eine </a:t>
+            </a:r>
+            <a:r>
+              <a:rPr lang="de-DE" dirty="0" err="1"/>
+              <a:t>phase</a:t>
+            </a:r>
+            <a:r>
+              <a:rPr lang="de-DE" dirty="0"/>
+              <a:t> ausführst dann werden die vorherige </a:t>
+            </a:r>
+            <a:r>
+              <a:rPr lang="de-DE" dirty="0" err="1"/>
+              <a:t>phase</a:t>
+            </a:r>
+            <a:r>
+              <a:rPr lang="de-DE" dirty="0"/>
+              <a:t> mit ausgeführt.</a:t>
+            </a:r>
+          </a:p>
+          <a:p>
+            <a:endParaRPr lang="de-DE" dirty="0"/>
+          </a:p>
+          <a:p>
+            <a:r>
+              <a:rPr lang="de-DE" dirty="0" err="1"/>
+              <a:t>mvn</a:t>
+            </a:r>
+            <a:r>
+              <a:rPr lang="de-DE" dirty="0"/>
+              <a:t> </a:t>
+            </a:r>
+            <a:r>
+              <a:rPr lang="de-DE" dirty="0" err="1"/>
+              <a:t>package</a:t>
+            </a:r>
+            <a:r>
+              <a:rPr lang="de-DE" dirty="0"/>
+              <a:t> =&gt;  </a:t>
+            </a:r>
+            <a:r>
+              <a:rPr lang="de-DE" dirty="0" err="1"/>
+              <a:t>mvn</a:t>
+            </a:r>
+            <a:r>
+              <a:rPr lang="de-DE" dirty="0"/>
+              <a:t> </a:t>
+            </a:r>
+            <a:r>
+              <a:rPr lang="de-DE" dirty="0" err="1"/>
+              <a:t>validate</a:t>
+            </a:r>
+            <a:r>
+              <a:rPr lang="de-DE" dirty="0"/>
+              <a:t> + </a:t>
+            </a:r>
+            <a:r>
+              <a:rPr lang="de-DE" dirty="0" err="1"/>
+              <a:t>compile</a:t>
+            </a:r>
+            <a:r>
+              <a:rPr lang="de-DE" dirty="0"/>
+              <a:t> + (</a:t>
+            </a:r>
+            <a:r>
+              <a:rPr lang="de-DE" dirty="0" err="1"/>
+              <a:t>test</a:t>
+            </a:r>
+            <a:r>
+              <a:rPr lang="de-DE" dirty="0"/>
+              <a:t>) und dann </a:t>
+            </a:r>
+            <a:r>
+              <a:rPr lang="de-DE" dirty="0" err="1"/>
+              <a:t>package</a:t>
+            </a:r>
+            <a:endParaRPr lang="de-DE" dirty="0"/>
+          </a:p>
+        </p:txBody>
+      </p:sp>
+    </p:spTree>
+    <p:extLst>
+      <p:ext uri="{BB962C8B-B14F-4D97-AF65-F5344CB8AC3E}">
+        <p14:creationId xmlns:p14="http://schemas.microsoft.com/office/powerpoint/2010/main" val="1820818777"/>
       </p:ext>
     </p:extLst>
   </p:cSld>
@@ -3925,10 +3982,38 @@
       </p:grpSpPr>
       <p:sp>
         <p:nvSpPr>
+          <p:cNvPr id="2" name="Titel 1">
+            <a:extLst>
+              <a:ext uri="{FF2B5EF4-FFF2-40B4-BE49-F238E27FC236}">
+                <a16:creationId xmlns:a16="http://schemas.microsoft.com/office/drawing/2014/main" id="{80C5C80F-5F04-1E4B-877D-429F78461C38}"/>
+              </a:ext>
+            </a:extLst>
+          </p:cNvPr>
+          <p:cNvSpPr>
+            <a:spLocks noGrp="1"/>
+          </p:cNvSpPr>
+          <p:nvPr>
+            <p:ph type="title"/>
+          </p:nvPr>
+        </p:nvSpPr>
+        <p:spPr/>
+        <p:txBody>
+          <a:bodyPr/>
+          <a:lstStyle/>
+          <a:p>
+            <a:r>
+              <a:rPr lang="de-DE" dirty="0"/>
+              <a:t>Inhaltverzeichnis</a:t>
+            </a:r>
+          </a:p>
+        </p:txBody>
+      </p:sp>
+      <p:sp>
+        <p:nvSpPr>
           <p:cNvPr id="3" name="Inhaltsplatzhalter 2">
             <a:extLst>
               <a:ext uri="{FF2B5EF4-FFF2-40B4-BE49-F238E27FC236}">
-                <a16:creationId xmlns:a16="http://schemas.microsoft.com/office/drawing/2014/main" id="{8D437F87-F73B-7040-8C5B-0DE7D7BDE4D5}"/>
+                <a16:creationId xmlns:a16="http://schemas.microsoft.com/office/drawing/2014/main" id="{B260C21E-A738-614C-9409-D247E80A4FA6}"/>
               </a:ext>
             </a:extLst>
           </p:cNvPr>
@@ -3939,14 +4024,11 @@
             <p:ph idx="1"/>
           </p:nvPr>
         </p:nvSpPr>
-        <p:spPr>
-          <a:xfrm>
-            <a:off x="838200" y="385763"/>
-            <a:ext cx="10515600" cy="5791200"/>
-          </a:xfrm>
-        </p:spPr>
-        <p:txBody>
-          <a:bodyPr/>
+        <p:spPr/>
+        <p:txBody>
+          <a:bodyPr>
+            <a:normAutofit/>
+          </a:bodyPr>
           <a:lstStyle/>
           <a:p>
             <a:r>
@@ -3960,21 +4042,6 @@
             <a:endParaRPr lang="de-DE" dirty="0"/>
           </a:p>
           <a:p>
-            <a:pPr lvl="1"/>
-            <a:r>
-              <a:rPr lang="de-DE" dirty="0"/>
-              <a:t>Wie verbinde ich </a:t>
-            </a:r>
-            <a:r>
-              <a:rPr lang="de-DE" dirty="0" err="1"/>
-              <a:t>mvn</a:t>
-            </a:r>
-            <a:r>
-              <a:rPr lang="de-DE" dirty="0"/>
-              <a:t> mit Nexus</a:t>
-            </a:r>
-          </a:p>
-          <a:p>
             <a:r>
               <a:rPr lang="de-DE" dirty="0"/>
               <a:t>MVN </a:t>
@@ -3990,47 +4057,48 @@
               <a:rPr lang="de-DE" dirty="0" err="1"/>
               <a:t>Dependencies</a:t>
             </a:r>
+            <a:r>
+              <a:rPr lang="de-DE" dirty="0"/>
+              <a:t> </a:t>
+            </a:r>
+            <a:r>
+              <a:rPr lang="de-DE" dirty="0" err="1"/>
+              <a:t>mechanismus</a:t>
+            </a:r>
             <a:endParaRPr lang="de-DE" dirty="0"/>
           </a:p>
           <a:p>
             <a:r>
               <a:rPr lang="de-DE" dirty="0"/>
-              <a:t>Project </a:t>
-            </a:r>
-            <a:r>
-              <a:rPr lang="de-DE" dirty="0" err="1"/>
-              <a:t>description</a:t>
+              <a:t>Project tags</a:t>
+            </a:r>
+          </a:p>
+          <a:p>
+            <a:r>
+              <a:rPr lang="de-DE" dirty="0" err="1"/>
+              <a:t>Plugins</a:t>
             </a:r>
             <a:endParaRPr lang="de-DE" dirty="0"/>
           </a:p>
           <a:p>
             <a:r>
               <a:rPr lang="de-DE" dirty="0" err="1"/>
-              <a:t>Plugins</a:t>
+              <a:t>Repositories</a:t>
             </a:r>
             <a:endParaRPr lang="de-DE" dirty="0"/>
           </a:p>
           <a:p>
             <a:r>
               <a:rPr lang="de-DE" dirty="0" err="1"/>
-              <a:t>Repositories</a:t>
+              <a:t>Profiles</a:t>
             </a:r>
             <a:endParaRPr lang="de-DE" dirty="0"/>
           </a:p>
           <a:p>
             <a:r>
-              <a:rPr lang="de-DE" dirty="0"/>
-              <a:t>Profile</a:t>
-            </a:r>
-          </a:p>
-          <a:p>
-            <a:r>
               <a:rPr lang="de-DE" dirty="0" err="1"/>
               <a:t>Archetypes</a:t>
             </a:r>
-            <a:endParaRPr lang="de-DE" dirty="0"/>
-          </a:p>
-          <a:p>
             <a:endParaRPr lang="de-DE" dirty="0"/>
           </a:p>
           <a:p>
@@ -4041,7 +4109,7 @@
     </p:spTree>
     <p:extLst>
       <p:ext uri="{BB962C8B-B14F-4D97-AF65-F5344CB8AC3E}">
-        <p14:creationId xmlns:p14="http://schemas.microsoft.com/office/powerpoint/2010/main" val="3518505685"/>
+        <p14:creationId xmlns:p14="http://schemas.microsoft.com/office/powerpoint/2010/main" val="1455811269"/>
       </p:ext>
     </p:extLst>
   </p:cSld>
@@ -4070,652 +4138,76 @@
       </p:grpSpPr>
       <p:sp>
         <p:nvSpPr>
-          <p:cNvPr id="4" name="Rechteck 3">
-            <a:extLst>
-              <a:ext uri="{FF2B5EF4-FFF2-40B4-BE49-F238E27FC236}">
-                <a16:creationId xmlns:a16="http://schemas.microsoft.com/office/drawing/2014/main" id="{FC516A4B-4388-134A-B2CE-51375E651EB1}"/>
-              </a:ext>
-            </a:extLst>
-          </p:cNvPr>
-          <p:cNvSpPr/>
-          <p:nvPr/>
-        </p:nvSpPr>
+          <p:cNvPr id="2" name="Titel 1">
+            <a:extLst>
+              <a:ext uri="{FF2B5EF4-FFF2-40B4-BE49-F238E27FC236}">
+                <a16:creationId xmlns:a16="http://schemas.microsoft.com/office/drawing/2014/main" id="{DF5CD45E-A225-E549-8D99-73783244387E}"/>
+              </a:ext>
+            </a:extLst>
+          </p:cNvPr>
+          <p:cNvSpPr>
+            <a:spLocks noGrp="1"/>
+          </p:cNvSpPr>
+          <p:nvPr>
+            <p:ph type="title"/>
+          </p:nvPr>
+        </p:nvSpPr>
+        <p:spPr/>
+        <p:txBody>
+          <a:bodyPr/>
+          <a:lstStyle/>
+          <a:p>
+            <a:r>
+              <a:rPr lang="de-DE" dirty="0"/>
+              <a:t>MVN + NEXUS </a:t>
+            </a:r>
+            <a:r>
+              <a:rPr lang="de-DE" dirty="0" err="1"/>
+              <a:t>lifecycle</a:t>
+            </a:r>
+            <a:br>
+              <a:rPr lang="de-DE" dirty="0"/>
+            </a:br>
+            <a:endParaRPr lang="de-DE" dirty="0"/>
+          </a:p>
+        </p:txBody>
+      </p:sp>
+      <p:pic>
+        <p:nvPicPr>
+          <p:cNvPr id="4" name="Inhaltsplatzhalter 3">
+            <a:extLst>
+              <a:ext uri="{FF2B5EF4-FFF2-40B4-BE49-F238E27FC236}">
+                <a16:creationId xmlns:a16="http://schemas.microsoft.com/office/drawing/2014/main" id="{8253F75B-CB91-B64F-9552-88CDB0611E95}"/>
+              </a:ext>
+            </a:extLst>
+          </p:cNvPr>
+          <p:cNvPicPr>
+            <a:picLocks noGrp="1" noChangeAspect="1"/>
+          </p:cNvPicPr>
+          <p:nvPr>
+            <p:ph idx="1"/>
+          </p:nvPr>
+        </p:nvPicPr>
+        <p:blipFill>
+          <a:blip r:embed="rId2"/>
+          <a:stretch>
+            <a:fillRect/>
+          </a:stretch>
+        </p:blipFill>
         <p:spPr>
           <a:xfrm>
-            <a:off x="2339976" y="740569"/>
-            <a:ext cx="3228975" cy="1900238"/>
+            <a:off x="957263" y="1314450"/>
+            <a:ext cx="8258175" cy="4862513"/>
           </a:xfrm>
           <a:prstGeom prst="rect">
             <a:avLst/>
           </a:prstGeom>
         </p:spPr>
-        <p:style>
-          <a:lnRef idx="2">
-            <a:schemeClr val="accent1">
-              <a:shade val="50000"/>
-            </a:schemeClr>
-          </a:lnRef>
-          <a:fillRef idx="1">
-            <a:schemeClr val="accent1"/>
-          </a:fillRef>
-          <a:effectRef idx="0">
-            <a:schemeClr val="accent1"/>
-          </a:effectRef>
-          <a:fontRef idx="minor">
-            <a:schemeClr val="lt1"/>
-          </a:fontRef>
-        </p:style>
-        <p:txBody>
-          <a:bodyPr rtlCol="0" anchor="ctr"/>
-          <a:lstStyle/>
-          <a:p>
-            <a:pPr algn="ctr"/>
-            <a:r>
-              <a:rPr lang="de-DE" dirty="0"/>
-              <a:t>Central Nexus kann jede schauen</a:t>
-            </a:r>
-          </a:p>
-        </p:txBody>
-      </p:sp>
-      <p:cxnSp>
-        <p:nvCxnSpPr>
-          <p:cNvPr id="7" name="Gerade Verbindung mit Pfeil 6">
-            <a:extLst>
-              <a:ext uri="{FF2B5EF4-FFF2-40B4-BE49-F238E27FC236}">
-                <a16:creationId xmlns:a16="http://schemas.microsoft.com/office/drawing/2014/main" id="{05F611A1-0158-1E4C-A436-A36238DB52A6}"/>
-              </a:ext>
-            </a:extLst>
-          </p:cNvPr>
-          <p:cNvCxnSpPr>
-            <a:cxnSpLocks/>
-            <a:endCxn id="4" idx="3"/>
-          </p:cNvCxnSpPr>
-          <p:nvPr/>
-        </p:nvCxnSpPr>
-        <p:spPr>
-          <a:xfrm flipH="1">
-            <a:off x="5568951" y="1571890"/>
-            <a:ext cx="2668586" cy="118798"/>
-          </a:xfrm>
-          <a:prstGeom prst="straightConnector1">
-            <a:avLst/>
-          </a:prstGeom>
-          <a:ln w="57150">
-            <a:tailEnd type="triangle"/>
-          </a:ln>
-        </p:spPr>
-        <p:style>
-          <a:lnRef idx="1">
-            <a:schemeClr val="accent1"/>
-          </a:lnRef>
-          <a:fillRef idx="0">
-            <a:schemeClr val="accent1"/>
-          </a:fillRef>
-          <a:effectRef idx="0">
-            <a:schemeClr val="accent1"/>
-          </a:effectRef>
-          <a:fontRef idx="minor">
-            <a:schemeClr val="tx1"/>
-          </a:fontRef>
-        </p:style>
-      </p:cxnSp>
-      <p:sp>
-        <p:nvSpPr>
-          <p:cNvPr id="14" name="Rechteck 13">
-            <a:extLst>
-              <a:ext uri="{FF2B5EF4-FFF2-40B4-BE49-F238E27FC236}">
-                <a16:creationId xmlns:a16="http://schemas.microsoft.com/office/drawing/2014/main" id="{A74863D0-8616-824B-95C6-510FC11CF62C}"/>
-              </a:ext>
-            </a:extLst>
-          </p:cNvPr>
-          <p:cNvSpPr/>
-          <p:nvPr/>
-        </p:nvSpPr>
-        <p:spPr>
-          <a:xfrm>
-            <a:off x="4097867" y="3535626"/>
-            <a:ext cx="3801533" cy="3863975"/>
-          </a:xfrm>
-          <a:prstGeom prst="rect">
-            <a:avLst/>
-          </a:prstGeom>
-          <a:solidFill>
-            <a:srgbClr val="00B050"/>
-          </a:solidFill>
-        </p:spPr>
-        <p:style>
-          <a:lnRef idx="2">
-            <a:schemeClr val="accent1">
-              <a:shade val="50000"/>
-            </a:schemeClr>
-          </a:lnRef>
-          <a:fillRef idx="1">
-            <a:schemeClr val="accent1"/>
-          </a:fillRef>
-          <a:effectRef idx="0">
-            <a:schemeClr val="accent1"/>
-          </a:effectRef>
-          <a:fontRef idx="minor">
-            <a:schemeClr val="lt1"/>
-          </a:fontRef>
-        </p:style>
-        <p:txBody>
-          <a:bodyPr rtlCol="0" anchor="ctr"/>
-          <a:lstStyle/>
-          <a:p>
-            <a:pPr algn="ctr"/>
-            <a:r>
-              <a:rPr lang="de-DE" b="1" dirty="0" err="1">
-                <a:solidFill>
-                  <a:schemeClr val="tx1"/>
-                </a:solidFill>
-              </a:rPr>
-              <a:t>Miror</a:t>
-            </a:r>
-            <a:r>
-              <a:rPr lang="de-DE" b="1" dirty="0">
-                <a:solidFill>
-                  <a:schemeClr val="tx1"/>
-                </a:solidFill>
-              </a:rPr>
-              <a:t> oder Eigene Nexus (</a:t>
-            </a:r>
-            <a:r>
-              <a:rPr lang="de-DE" b="1" dirty="0" err="1">
-                <a:solidFill>
-                  <a:schemeClr val="tx1"/>
-                </a:solidFill>
-              </a:rPr>
-              <a:t>www.raab.nexus.de</a:t>
-            </a:r>
-            <a:r>
-              <a:rPr lang="de-DE" b="1" dirty="0">
-                <a:solidFill>
-                  <a:schemeClr val="tx1"/>
-                </a:solidFill>
-              </a:rPr>
-              <a:t>)</a:t>
-            </a:r>
-          </a:p>
-          <a:p>
-            <a:pPr algn="ctr"/>
-            <a:r>
-              <a:rPr lang="de-DE" dirty="0">
-                <a:solidFill>
-                  <a:schemeClr val="tx1"/>
-                </a:solidFill>
-              </a:rPr>
-              <a:t>= manche </a:t>
-            </a:r>
-            <a:r>
-              <a:rPr lang="de-DE" dirty="0" err="1">
-                <a:solidFill>
-                  <a:schemeClr val="tx1"/>
-                </a:solidFill>
-              </a:rPr>
-              <a:t>artifact</a:t>
-            </a:r>
-            <a:r>
-              <a:rPr lang="de-DE" dirty="0">
-                <a:solidFill>
-                  <a:schemeClr val="tx1"/>
-                </a:solidFill>
-              </a:rPr>
-              <a:t> von Central + meine eigene programmierte </a:t>
-            </a:r>
-            <a:r>
-              <a:rPr lang="de-DE" dirty="0" err="1">
-                <a:solidFill>
-                  <a:schemeClr val="tx1"/>
-                </a:solidFill>
-              </a:rPr>
-              <a:t>Libray</a:t>
-            </a:r>
-            <a:r>
-              <a:rPr lang="de-DE" dirty="0">
-                <a:solidFill>
-                  <a:schemeClr val="tx1"/>
-                </a:solidFill>
-              </a:rPr>
-              <a:t>/</a:t>
-            </a:r>
-            <a:r>
-              <a:rPr lang="de-DE" dirty="0" err="1">
-                <a:solidFill>
-                  <a:schemeClr val="tx1"/>
-                </a:solidFill>
-              </a:rPr>
-              <a:t>Artifact</a:t>
-            </a:r>
-            <a:endParaRPr lang="de-DE" dirty="0">
-              <a:solidFill>
-                <a:schemeClr val="tx1"/>
-              </a:solidFill>
-            </a:endParaRPr>
-          </a:p>
-          <a:p>
-            <a:pPr algn="ctr"/>
-            <a:endParaRPr lang="de-DE" dirty="0">
-              <a:solidFill>
-                <a:schemeClr val="tx1"/>
-              </a:solidFill>
-            </a:endParaRPr>
-          </a:p>
-          <a:p>
-            <a:pPr algn="ctr"/>
-            <a:endParaRPr lang="de-DE" dirty="0">
-              <a:solidFill>
-                <a:schemeClr val="tx1"/>
-              </a:solidFill>
-            </a:endParaRPr>
-          </a:p>
-          <a:p>
-            <a:pPr algn="ctr"/>
-            <a:endParaRPr lang="de-DE" dirty="0">
-              <a:solidFill>
-                <a:schemeClr val="tx1"/>
-              </a:solidFill>
-            </a:endParaRPr>
-          </a:p>
-          <a:p>
-            <a:pPr algn="ctr"/>
-            <a:r>
-              <a:rPr lang="de-DE" dirty="0">
-                <a:solidFill>
-                  <a:schemeClr val="tx1"/>
-                </a:solidFill>
-              </a:rPr>
-              <a:t>Wir wollen nicht dass jeder unsere </a:t>
-            </a:r>
-            <a:r>
-              <a:rPr lang="de-DE" dirty="0" err="1">
-                <a:solidFill>
-                  <a:schemeClr val="tx1"/>
-                </a:solidFill>
-              </a:rPr>
-              <a:t>library</a:t>
-            </a:r>
-            <a:r>
-              <a:rPr lang="de-DE" dirty="0">
-                <a:solidFill>
-                  <a:schemeClr val="tx1"/>
-                </a:solidFill>
-              </a:rPr>
-              <a:t> benutzt</a:t>
-            </a:r>
-          </a:p>
-        </p:txBody>
-      </p:sp>
-      <p:sp>
-        <p:nvSpPr>
-          <p:cNvPr id="20" name="Rechteck 19">
-            <a:extLst>
-              <a:ext uri="{FF2B5EF4-FFF2-40B4-BE49-F238E27FC236}">
-                <a16:creationId xmlns:a16="http://schemas.microsoft.com/office/drawing/2014/main" id="{94CAC2A8-B01B-E44A-B0B0-0FB8457D275D}"/>
-              </a:ext>
-            </a:extLst>
-          </p:cNvPr>
-          <p:cNvSpPr/>
-          <p:nvPr/>
-        </p:nvSpPr>
-        <p:spPr>
-          <a:xfrm>
-            <a:off x="8237537" y="740569"/>
-            <a:ext cx="3228975" cy="1900238"/>
-          </a:xfrm>
-          <a:prstGeom prst="rect">
-            <a:avLst/>
-          </a:prstGeom>
-        </p:spPr>
-        <p:style>
-          <a:lnRef idx="2">
-            <a:schemeClr val="accent1">
-              <a:shade val="50000"/>
-            </a:schemeClr>
-          </a:lnRef>
-          <a:fillRef idx="1">
-            <a:schemeClr val="accent1"/>
-          </a:fillRef>
-          <a:effectRef idx="0">
-            <a:schemeClr val="accent1"/>
-          </a:effectRef>
-          <a:fontRef idx="minor">
-            <a:schemeClr val="lt1"/>
-          </a:fontRef>
-        </p:style>
-        <p:txBody>
-          <a:bodyPr rtlCol="0" anchor="ctr"/>
-          <a:lstStyle/>
-          <a:p>
-            <a:pPr algn="ctr"/>
-            <a:r>
-              <a:rPr lang="de-DE" dirty="0"/>
-              <a:t>Eigene  </a:t>
-            </a:r>
-            <a:r>
-              <a:rPr lang="de-DE" dirty="0" err="1"/>
-              <a:t>repo</a:t>
-            </a:r>
-            <a:endParaRPr lang="de-DE" dirty="0"/>
-          </a:p>
-        </p:txBody>
-      </p:sp>
-      <p:cxnSp>
-        <p:nvCxnSpPr>
-          <p:cNvPr id="21" name="Gerade Verbindung mit Pfeil 20">
-            <a:extLst>
-              <a:ext uri="{FF2B5EF4-FFF2-40B4-BE49-F238E27FC236}">
-                <a16:creationId xmlns:a16="http://schemas.microsoft.com/office/drawing/2014/main" id="{BFCC2439-F1D3-BE4D-B676-423EDE79CA52}"/>
-              </a:ext>
-            </a:extLst>
-          </p:cNvPr>
-          <p:cNvCxnSpPr>
-            <a:cxnSpLocks/>
-          </p:cNvCxnSpPr>
-          <p:nvPr/>
-        </p:nvCxnSpPr>
-        <p:spPr>
-          <a:xfrm flipV="1">
-            <a:off x="6284912" y="2650595"/>
-            <a:ext cx="3567112" cy="885031"/>
-          </a:xfrm>
-          <a:prstGeom prst="straightConnector1">
-            <a:avLst/>
-          </a:prstGeom>
-          <a:ln w="57150">
-            <a:tailEnd type="triangle"/>
-          </a:ln>
-        </p:spPr>
-        <p:style>
-          <a:lnRef idx="1">
-            <a:schemeClr val="accent1"/>
-          </a:lnRef>
-          <a:fillRef idx="0">
-            <a:schemeClr val="accent1"/>
-          </a:fillRef>
-          <a:effectRef idx="0">
-            <a:schemeClr val="accent1"/>
-          </a:effectRef>
-          <a:fontRef idx="minor">
-            <a:schemeClr val="tx1"/>
-          </a:fontRef>
-        </p:style>
-      </p:cxnSp>
-      <p:sp>
-        <p:nvSpPr>
-          <p:cNvPr id="24" name="Rechteck 23">
-            <a:extLst>
-              <a:ext uri="{FF2B5EF4-FFF2-40B4-BE49-F238E27FC236}">
-                <a16:creationId xmlns:a16="http://schemas.microsoft.com/office/drawing/2014/main" id="{CFE20E14-B055-D34B-AC51-EB85F495E8BC}"/>
-              </a:ext>
-            </a:extLst>
-          </p:cNvPr>
-          <p:cNvSpPr/>
-          <p:nvPr/>
-        </p:nvSpPr>
-        <p:spPr>
-          <a:xfrm flipH="1">
-            <a:off x="917576" y="4402666"/>
-            <a:ext cx="2032000" cy="572293"/>
-          </a:xfrm>
-          <a:prstGeom prst="rect">
-            <a:avLst/>
-          </a:prstGeom>
-        </p:spPr>
-        <p:style>
-          <a:lnRef idx="2">
-            <a:schemeClr val="accent1">
-              <a:shade val="50000"/>
-            </a:schemeClr>
-          </a:lnRef>
-          <a:fillRef idx="1">
-            <a:schemeClr val="accent1"/>
-          </a:fillRef>
-          <a:effectRef idx="0">
-            <a:schemeClr val="accent1"/>
-          </a:effectRef>
-          <a:fontRef idx="minor">
-            <a:schemeClr val="lt1"/>
-          </a:fontRef>
-        </p:style>
-        <p:txBody>
-          <a:bodyPr rtlCol="0" anchor="ctr"/>
-          <a:lstStyle/>
-          <a:p>
-            <a:pPr algn="ctr"/>
-            <a:r>
-              <a:rPr lang="de-DE" dirty="0" err="1"/>
-              <a:t>Setting.xml</a:t>
-            </a:r>
-            <a:endParaRPr lang="de-DE" dirty="0"/>
-          </a:p>
-        </p:txBody>
-      </p:sp>
-      <p:cxnSp>
-        <p:nvCxnSpPr>
-          <p:cNvPr id="26" name="Gerade Verbindung mit Pfeil 25">
-            <a:extLst>
-              <a:ext uri="{FF2B5EF4-FFF2-40B4-BE49-F238E27FC236}">
-                <a16:creationId xmlns:a16="http://schemas.microsoft.com/office/drawing/2014/main" id="{713A0AB5-E5C3-F64A-BC4E-63ED45809DB6}"/>
-              </a:ext>
-            </a:extLst>
-          </p:cNvPr>
-          <p:cNvCxnSpPr/>
-          <p:nvPr/>
-        </p:nvCxnSpPr>
-        <p:spPr>
-          <a:xfrm>
-            <a:off x="2980267" y="4724400"/>
-            <a:ext cx="1117600" cy="0"/>
-          </a:xfrm>
-          <a:prstGeom prst="straightConnector1">
-            <a:avLst/>
-          </a:prstGeom>
-          <a:ln>
-            <a:tailEnd type="triangle"/>
-          </a:ln>
-        </p:spPr>
-        <p:style>
-          <a:lnRef idx="1">
-            <a:schemeClr val="accent1"/>
-          </a:lnRef>
-          <a:fillRef idx="0">
-            <a:schemeClr val="accent1"/>
-          </a:fillRef>
-          <a:effectRef idx="0">
-            <a:schemeClr val="accent1"/>
-          </a:effectRef>
-          <a:fontRef idx="minor">
-            <a:schemeClr val="tx1"/>
-          </a:fontRef>
-        </p:style>
-      </p:cxnSp>
-      <p:sp>
-        <p:nvSpPr>
-          <p:cNvPr id="33" name="Rechteck 32">
-            <a:extLst>
-              <a:ext uri="{FF2B5EF4-FFF2-40B4-BE49-F238E27FC236}">
-                <a16:creationId xmlns:a16="http://schemas.microsoft.com/office/drawing/2014/main" id="{6DB3F299-6BF9-5945-9BBD-03872D6752FE}"/>
-              </a:ext>
-            </a:extLst>
-          </p:cNvPr>
-          <p:cNvSpPr/>
-          <p:nvPr/>
-        </p:nvSpPr>
-        <p:spPr>
-          <a:xfrm>
-            <a:off x="8237537" y="3826933"/>
-            <a:ext cx="3228975" cy="2624667"/>
-          </a:xfrm>
-          <a:prstGeom prst="rect">
-            <a:avLst/>
-          </a:prstGeom>
-          <a:solidFill>
-            <a:schemeClr val="accent4">
-              <a:lumMod val="20000"/>
-              <a:lumOff val="80000"/>
-            </a:schemeClr>
-          </a:solidFill>
-        </p:spPr>
-        <p:style>
-          <a:lnRef idx="2">
-            <a:schemeClr val="accent1">
-              <a:shade val="50000"/>
-            </a:schemeClr>
-          </a:lnRef>
-          <a:fillRef idx="1">
-            <a:schemeClr val="accent1"/>
-          </a:fillRef>
-          <a:effectRef idx="0">
-            <a:schemeClr val="accent1"/>
-          </a:effectRef>
-          <a:fontRef idx="minor">
-            <a:schemeClr val="lt1"/>
-          </a:fontRef>
-        </p:style>
-        <p:txBody>
-          <a:bodyPr rtlCol="0" anchor="ctr"/>
-          <a:lstStyle/>
-          <a:p>
-            <a:pPr algn="ctr"/>
-            <a:r>
-              <a:rPr lang="de-DE" dirty="0">
-                <a:solidFill>
-                  <a:schemeClr val="tx1"/>
-                </a:solidFill>
-              </a:rPr>
-              <a:t>Mit </a:t>
-            </a:r>
-            <a:r>
-              <a:rPr lang="de-DE" dirty="0" err="1">
-                <a:solidFill>
-                  <a:schemeClr val="tx1"/>
-                </a:solidFill>
-              </a:rPr>
-              <a:t>miror</a:t>
-            </a:r>
-            <a:r>
-              <a:rPr lang="de-DE" dirty="0">
-                <a:solidFill>
-                  <a:schemeClr val="tx1"/>
-                </a:solidFill>
-              </a:rPr>
-              <a:t> sagst du </a:t>
-            </a:r>
-            <a:r>
-              <a:rPr lang="de-DE" dirty="0" err="1">
-                <a:solidFill>
-                  <a:schemeClr val="tx1"/>
-                </a:solidFill>
-              </a:rPr>
-              <a:t>maven</a:t>
-            </a:r>
-            <a:r>
-              <a:rPr lang="de-DE" dirty="0">
-                <a:solidFill>
-                  <a:schemeClr val="tx1"/>
-                </a:solidFill>
-              </a:rPr>
-              <a:t>. Ich benutze nicht mehr der </a:t>
-            </a:r>
-            <a:r>
-              <a:rPr lang="de-DE" dirty="0" err="1">
-                <a:solidFill>
-                  <a:schemeClr val="tx1"/>
-                </a:solidFill>
-              </a:rPr>
-              <a:t>central</a:t>
-            </a:r>
-            <a:r>
-              <a:rPr lang="de-DE" dirty="0">
-                <a:solidFill>
-                  <a:schemeClr val="tx1"/>
-                </a:solidFill>
-              </a:rPr>
-              <a:t> </a:t>
-            </a:r>
-            <a:r>
-              <a:rPr lang="de-DE" dirty="0" err="1">
-                <a:solidFill>
-                  <a:schemeClr val="tx1"/>
-                </a:solidFill>
-              </a:rPr>
-              <a:t>repo</a:t>
-            </a:r>
-            <a:r>
-              <a:rPr lang="de-DE" dirty="0">
-                <a:solidFill>
-                  <a:schemeClr val="tx1"/>
-                </a:solidFill>
-              </a:rPr>
-              <a:t> als </a:t>
-            </a:r>
-            <a:r>
-              <a:rPr lang="de-DE" dirty="0" err="1">
-                <a:solidFill>
-                  <a:schemeClr val="tx1"/>
-                </a:solidFill>
-              </a:rPr>
-              <a:t>default</a:t>
-            </a:r>
-            <a:r>
-              <a:rPr lang="de-DE" dirty="0">
-                <a:solidFill>
-                  <a:schemeClr val="tx1"/>
-                </a:solidFill>
-              </a:rPr>
-              <a:t> sondern meine eigene.</a:t>
-            </a:r>
-          </a:p>
-        </p:txBody>
-      </p:sp>
-      <p:cxnSp>
-        <p:nvCxnSpPr>
-          <p:cNvPr id="35" name="Gerade Verbindung mit Pfeil 34">
-            <a:extLst>
-              <a:ext uri="{FF2B5EF4-FFF2-40B4-BE49-F238E27FC236}">
-                <a16:creationId xmlns:a16="http://schemas.microsoft.com/office/drawing/2014/main" id="{2E798D3F-9FD0-004C-B08F-6E548B993A60}"/>
-              </a:ext>
-            </a:extLst>
-          </p:cNvPr>
-          <p:cNvCxnSpPr>
-            <a:cxnSpLocks/>
-            <a:endCxn id="4" idx="2"/>
-          </p:cNvCxnSpPr>
-          <p:nvPr/>
-        </p:nvCxnSpPr>
-        <p:spPr>
-          <a:xfrm flipH="1" flipV="1">
-            <a:off x="3954464" y="2640807"/>
-            <a:ext cx="1311803" cy="894819"/>
-          </a:xfrm>
-          <a:prstGeom prst="straightConnector1">
-            <a:avLst/>
-          </a:prstGeom>
-          <a:ln w="38100">
-            <a:prstDash val="dash"/>
-            <a:tailEnd type="triangle"/>
-          </a:ln>
-        </p:spPr>
-        <p:style>
-          <a:lnRef idx="1">
-            <a:schemeClr val="accent1"/>
-          </a:lnRef>
-          <a:fillRef idx="0">
-            <a:schemeClr val="accent1"/>
-          </a:fillRef>
-          <a:effectRef idx="0">
-            <a:schemeClr val="accent1"/>
-          </a:effectRef>
-          <a:fontRef idx="minor">
-            <a:schemeClr val="tx1"/>
-          </a:fontRef>
-        </p:style>
-      </p:cxnSp>
+      </p:pic>
     </p:spTree>
     <p:extLst>
       <p:ext uri="{BB962C8B-B14F-4D97-AF65-F5344CB8AC3E}">
-        <p14:creationId xmlns:p14="http://schemas.microsoft.com/office/powerpoint/2010/main" val="2892935630"/>
+        <p14:creationId xmlns:p14="http://schemas.microsoft.com/office/powerpoint/2010/main" val="428519081"/>
       </p:ext>
     </p:extLst>
   </p:cSld>
@@ -4744,61 +4236,127 @@
       </p:grpSpPr>
       <p:sp>
         <p:nvSpPr>
-          <p:cNvPr id="4" name="Rechteck 3">
-            <a:extLst>
-              <a:ext uri="{FF2B5EF4-FFF2-40B4-BE49-F238E27FC236}">
-                <a16:creationId xmlns:a16="http://schemas.microsoft.com/office/drawing/2014/main" id="{952423F3-0C70-2E4D-8BAC-EC99A3520317}"/>
-              </a:ext>
-            </a:extLst>
-          </p:cNvPr>
-          <p:cNvSpPr/>
-          <p:nvPr/>
-        </p:nvSpPr>
-        <p:spPr>
-          <a:xfrm>
-            <a:off x="7620000" y="1219200"/>
-            <a:ext cx="4097867" cy="4978400"/>
-          </a:xfrm>
-          <a:prstGeom prst="rect">
-            <a:avLst/>
-          </a:prstGeom>
-        </p:spPr>
-        <p:style>
-          <a:lnRef idx="2">
-            <a:schemeClr val="accent1">
-              <a:shade val="50000"/>
-            </a:schemeClr>
-          </a:lnRef>
-          <a:fillRef idx="1">
-            <a:schemeClr val="accent1"/>
-          </a:fillRef>
-          <a:effectRef idx="0">
-            <a:schemeClr val="accent1"/>
-          </a:effectRef>
-          <a:fontRef idx="minor">
-            <a:schemeClr val="lt1"/>
-          </a:fontRef>
-        </p:style>
-        <p:txBody>
-          <a:bodyPr rtlCol="0" anchor="ctr"/>
-          <a:lstStyle/>
-          <a:p>
-            <a:pPr algn="ctr"/>
-            <a:r>
-              <a:rPr lang="de-DE" dirty="0"/>
-              <a:t>Ziel Server </a:t>
-            </a:r>
-            <a:r>
-              <a:rPr lang="de-DE" dirty="0" err="1"/>
-              <a:t>raab</a:t>
+          <p:cNvPr id="2" name="Titel 1">
+            <a:extLst>
+              <a:ext uri="{FF2B5EF4-FFF2-40B4-BE49-F238E27FC236}">
+                <a16:creationId xmlns:a16="http://schemas.microsoft.com/office/drawing/2014/main" id="{C8097655-36E4-E74C-B6C8-A90D68E44643}"/>
+              </a:ext>
+            </a:extLst>
+          </p:cNvPr>
+          <p:cNvSpPr>
+            <a:spLocks noGrp="1"/>
+          </p:cNvSpPr>
+          <p:nvPr>
+            <p:ph type="title"/>
+          </p:nvPr>
+        </p:nvSpPr>
+        <p:spPr/>
+        <p:txBody>
+          <a:bodyPr/>
+          <a:lstStyle/>
+          <a:p>
+            <a:r>
+              <a:rPr lang="de-DE" dirty="0"/>
+              <a:t>MAVEN + NEXUS </a:t>
+            </a:r>
+            <a:r>
+              <a:rPr lang="de-DE" dirty="0" err="1"/>
+              <a:t>Lifecycle</a:t>
             </a:r>
             <a:endParaRPr lang="de-DE" dirty="0"/>
           </a:p>
-          <a:p>
-            <a:pPr algn="ctr"/>
-            <a:r>
-              <a:rPr lang="de-DE" dirty="0"/>
-              <a:t>Proxy </a:t>
+        </p:txBody>
+      </p:sp>
+      <p:sp>
+        <p:nvSpPr>
+          <p:cNvPr id="3" name="Inhaltsplatzhalter 2">
+            <a:extLst>
+              <a:ext uri="{FF2B5EF4-FFF2-40B4-BE49-F238E27FC236}">
+                <a16:creationId xmlns:a16="http://schemas.microsoft.com/office/drawing/2014/main" id="{FCD11410-8EA8-154E-A6CA-5A8506E645C2}"/>
+              </a:ext>
+            </a:extLst>
+          </p:cNvPr>
+          <p:cNvSpPr>
+            <a:spLocks noGrp="1"/>
+          </p:cNvSpPr>
+          <p:nvPr>
+            <p:ph idx="1"/>
+          </p:nvPr>
+        </p:nvSpPr>
+        <p:spPr/>
+        <p:txBody>
+          <a:bodyPr/>
+          <a:lstStyle/>
+          <a:p>
+            <a:pPr marL="514350" indent="-514350">
+              <a:buAutoNum type="arabicPeriod"/>
+            </a:pPr>
+            <a:r>
+              <a:rPr lang="de-DE" dirty="0"/>
+              <a:t>Suche </a:t>
+            </a:r>
+            <a:r>
+              <a:rPr lang="de-DE" dirty="0" err="1"/>
+              <a:t>dependecy</a:t>
+            </a:r>
+            <a:r>
+              <a:rPr lang="de-DE" dirty="0"/>
+              <a:t> im Netz für eine gewünschte </a:t>
+            </a:r>
+            <a:r>
+              <a:rPr lang="de-DE" dirty="0" err="1"/>
+              <a:t>library</a:t>
+            </a:r>
+            <a:endParaRPr lang="de-DE" dirty="0"/>
+          </a:p>
+          <a:p>
+            <a:pPr marL="514350" indent="-514350">
+              <a:buAutoNum type="arabicPeriod"/>
+            </a:pPr>
+            <a:r>
+              <a:rPr lang="de-DE" dirty="0" err="1"/>
+              <a:t>Dependency</a:t>
+            </a:r>
+            <a:r>
+              <a:rPr lang="de-DE" dirty="0"/>
+              <a:t> Tag in </a:t>
+            </a:r>
+            <a:r>
+              <a:rPr lang="de-DE" dirty="0" err="1"/>
+              <a:t>Pom.xml</a:t>
+            </a:r>
+            <a:r>
+              <a:rPr lang="de-DE" dirty="0"/>
+              <a:t> eintragen</a:t>
+            </a:r>
+          </a:p>
+          <a:p>
+            <a:pPr marL="514350" indent="-514350">
+              <a:buAutoNum type="arabicPeriod"/>
+            </a:pPr>
+            <a:r>
+              <a:rPr lang="de-DE" dirty="0" err="1"/>
+              <a:t>Maven</a:t>
+            </a:r>
+            <a:r>
+              <a:rPr lang="de-DE" dirty="0"/>
+              <a:t> sucht </a:t>
+            </a:r>
+            <a:r>
+              <a:rPr lang="de-DE" dirty="0" err="1"/>
+              <a:t>jar</a:t>
+            </a:r>
+            <a:r>
+              <a:rPr lang="de-DE" dirty="0"/>
+              <a:t> von </a:t>
+            </a:r>
+            <a:r>
+              <a:rPr lang="de-DE" dirty="0" err="1"/>
+              <a:t>dependency</a:t>
+            </a:r>
+            <a:r>
+              <a:rPr lang="de-DE" dirty="0"/>
+              <a:t> in .m2 </a:t>
             </a:r>
             <a:r>
               <a:rPr lang="de-DE" dirty="0" err="1"/>
@@ -4806,75 +4364,61 @@
             </a:r>
             <a:r>
               <a:rPr lang="de-DE" dirty="0"/>
-              <a:t> (</a:t>
-            </a:r>
-            <a:r>
-              <a:rPr lang="de-DE" dirty="0" err="1"/>
-              <a:t>Schutzen</a:t>
+              <a:t>(lokal </a:t>
+            </a:r>
+            <a:r>
+              <a:rPr lang="de-DE" dirty="0" err="1"/>
+              <a:t>repo</a:t>
             </a:r>
             <a:r>
               <a:rPr lang="de-DE" dirty="0"/>
               <a:t>)</a:t>
             </a:r>
           </a:p>
-        </p:txBody>
-      </p:sp>
-      <p:sp>
-        <p:nvSpPr>
-          <p:cNvPr id="5" name="Rechteck 4">
-            <a:extLst>
-              <a:ext uri="{FF2B5EF4-FFF2-40B4-BE49-F238E27FC236}">
-                <a16:creationId xmlns:a16="http://schemas.microsoft.com/office/drawing/2014/main" id="{B9C0ED3E-900D-384E-BFE8-387A6B262AB6}"/>
-              </a:ext>
-            </a:extLst>
-          </p:cNvPr>
-          <p:cNvSpPr/>
-          <p:nvPr/>
-        </p:nvSpPr>
-        <p:spPr>
-          <a:xfrm>
-            <a:off x="5113867" y="1219200"/>
-            <a:ext cx="2150534" cy="4978400"/>
-          </a:xfrm>
-          <a:prstGeom prst="rect">
-            <a:avLst/>
-          </a:prstGeom>
-        </p:spPr>
-        <p:style>
-          <a:lnRef idx="2">
-            <a:schemeClr val="accent1">
-              <a:shade val="50000"/>
-            </a:schemeClr>
-          </a:lnRef>
-          <a:fillRef idx="1">
-            <a:schemeClr val="accent1"/>
-          </a:fillRef>
-          <a:effectRef idx="0">
-            <a:schemeClr val="accent1"/>
-          </a:effectRef>
-          <a:fontRef idx="minor">
-            <a:schemeClr val="lt1"/>
-          </a:fontRef>
-        </p:style>
-        <p:txBody>
-          <a:bodyPr rtlCol="0" anchor="ctr"/>
-          <a:lstStyle/>
-          <a:p>
-            <a:pPr algn="ctr"/>
-            <a:r>
-              <a:rPr lang="de-DE" dirty="0"/>
-              <a:t>Proxy</a:t>
-            </a:r>
-          </a:p>
-          <a:p>
-            <a:pPr algn="ctr"/>
-            <a:endParaRPr lang="de-DE" dirty="0"/>
-          </a:p>
-          <a:p>
-            <a:pPr algn="ctr"/>
-            <a:r>
-              <a:rPr lang="de-DE" dirty="0" err="1"/>
-              <a:t>Ya</a:t>
+          <a:p>
+            <a:pPr marL="514350" indent="-514350">
+              <a:buAutoNum type="arabicPeriod"/>
+            </a:pPr>
+            <a:r>
+              <a:rPr lang="de-DE" dirty="0"/>
+              <a:t>Ist </a:t>
+            </a:r>
+            <a:r>
+              <a:rPr lang="de-DE" dirty="0" err="1"/>
+              <a:t>Dependency</a:t>
+            </a:r>
+            <a:r>
+              <a:rPr lang="de-DE" dirty="0"/>
+              <a:t> drin dann nimmt </a:t>
+            </a:r>
+            <a:r>
+              <a:rPr lang="de-DE" dirty="0" err="1"/>
+              <a:t>mvn</a:t>
+            </a:r>
+            <a:r>
+              <a:rPr lang="de-DE" dirty="0"/>
+              <a:t> dir </a:t>
+            </a:r>
+            <a:r>
+              <a:rPr lang="de-DE" dirty="0" err="1"/>
+              <a:t>jar</a:t>
+            </a:r>
+            <a:r>
+              <a:rPr lang="de-DE" dirty="0"/>
+              <a:t> davon und lege es im Projekt ab</a:t>
+            </a:r>
+          </a:p>
+          <a:p>
+            <a:pPr marL="514350" indent="-514350">
+              <a:buAutoNum type="arabicPeriod"/>
+            </a:pPr>
+            <a:r>
+              <a:rPr lang="de-DE" dirty="0"/>
+              <a:t>Wenn nicht dann sucht </a:t>
+            </a:r>
+            <a:r>
+              <a:rPr lang="de-DE" dirty="0" err="1"/>
+              <a:t>mvn</a:t>
             </a:r>
             <a:r>
               <a:rPr lang="de-DE" dirty="0"/>
@@ -4882,198 +4426,43 @@
             </a:r>
             <a:r>
               <a:rPr lang="de-DE" dirty="0" err="1"/>
-              <a:t>ismaro</a:t>
-            </a:r>
-            <a:r>
-              <a:rPr lang="de-DE" dirty="0"/>
-              <a:t> hat die Rechte</a:t>
-            </a:r>
-          </a:p>
-        </p:txBody>
-      </p:sp>
-      <p:sp>
-        <p:nvSpPr>
-          <p:cNvPr id="6" name="Oval 5">
-            <a:extLst>
-              <a:ext uri="{FF2B5EF4-FFF2-40B4-BE49-F238E27FC236}">
-                <a16:creationId xmlns:a16="http://schemas.microsoft.com/office/drawing/2014/main" id="{166DF960-D2AB-394D-9D36-6AEA3345D8C7}"/>
-              </a:ext>
-            </a:extLst>
-          </p:cNvPr>
-          <p:cNvSpPr/>
-          <p:nvPr/>
-        </p:nvSpPr>
-        <p:spPr>
-          <a:xfrm>
-            <a:off x="558800" y="2878667"/>
-            <a:ext cx="1845733" cy="1828800"/>
-          </a:xfrm>
-          <a:prstGeom prst="ellipse">
-            <a:avLst/>
-          </a:prstGeom>
-        </p:spPr>
-        <p:style>
-          <a:lnRef idx="2">
-            <a:schemeClr val="accent1">
-              <a:shade val="50000"/>
-            </a:schemeClr>
-          </a:lnRef>
-          <a:fillRef idx="1">
-            <a:schemeClr val="accent1"/>
-          </a:fillRef>
-          <a:effectRef idx="0">
-            <a:schemeClr val="accent1"/>
-          </a:effectRef>
-          <a:fontRef idx="minor">
-            <a:schemeClr val="lt1"/>
-          </a:fontRef>
-        </p:style>
-        <p:txBody>
-          <a:bodyPr rtlCol="0" anchor="ctr"/>
-          <a:lstStyle/>
-          <a:p>
-            <a:pPr algn="ctr"/>
-            <a:r>
-              <a:rPr lang="de-DE" dirty="0" err="1"/>
-              <a:t>Ismaro</a:t>
-            </a:r>
-            <a:endParaRPr lang="de-DE" dirty="0"/>
-          </a:p>
-        </p:txBody>
-      </p:sp>
-      <p:cxnSp>
-        <p:nvCxnSpPr>
-          <p:cNvPr id="11" name="Gewinkelte Verbindung 10">
-            <a:extLst>
-              <a:ext uri="{FF2B5EF4-FFF2-40B4-BE49-F238E27FC236}">
-                <a16:creationId xmlns:a16="http://schemas.microsoft.com/office/drawing/2014/main" id="{0F7816E4-AEDB-C44B-BE24-823BA1D9B4FE}"/>
-              </a:ext>
-            </a:extLst>
-          </p:cNvPr>
-          <p:cNvCxnSpPr>
-            <a:cxnSpLocks/>
-            <a:endCxn id="4" idx="0"/>
-          </p:cNvCxnSpPr>
-          <p:nvPr/>
-        </p:nvCxnSpPr>
-        <p:spPr>
-          <a:xfrm flipV="1">
-            <a:off x="2082800" y="1219200"/>
-            <a:ext cx="7586134" cy="1778000"/>
-          </a:xfrm>
-          <a:prstGeom prst="bentConnector4">
-            <a:avLst>
-              <a:gd name="adj1" fmla="val 36496"/>
-              <a:gd name="adj2" fmla="val 154762"/>
-            </a:avLst>
-          </a:prstGeom>
-          <a:ln>
-            <a:tailEnd type="triangle"/>
-          </a:ln>
-        </p:spPr>
-        <p:style>
-          <a:lnRef idx="1">
-            <a:schemeClr val="accent2"/>
-          </a:lnRef>
-          <a:fillRef idx="0">
-            <a:schemeClr val="accent2"/>
-          </a:fillRef>
-          <a:effectRef idx="0">
-            <a:schemeClr val="accent2"/>
-          </a:effectRef>
-          <a:fontRef idx="minor">
-            <a:schemeClr val="tx1"/>
-          </a:fontRef>
-        </p:style>
-      </p:cxnSp>
-      <p:cxnSp>
-        <p:nvCxnSpPr>
-          <p:cNvPr id="16" name="Gerade Verbindung mit Pfeil 15">
-            <a:extLst>
-              <a:ext uri="{FF2B5EF4-FFF2-40B4-BE49-F238E27FC236}">
-                <a16:creationId xmlns:a16="http://schemas.microsoft.com/office/drawing/2014/main" id="{68957AB7-528F-6349-AF5B-9DA558466DE5}"/>
-              </a:ext>
-            </a:extLst>
-          </p:cNvPr>
-          <p:cNvCxnSpPr>
-            <a:stCxn id="6" idx="6"/>
-            <a:endCxn id="5" idx="1"/>
-          </p:cNvCxnSpPr>
-          <p:nvPr/>
-        </p:nvCxnSpPr>
-        <p:spPr>
-          <a:xfrm flipV="1">
-            <a:off x="2404533" y="3708400"/>
-            <a:ext cx="2709334" cy="84667"/>
-          </a:xfrm>
-          <a:prstGeom prst="straightConnector1">
-            <a:avLst/>
-          </a:prstGeom>
-          <a:ln>
-            <a:tailEnd type="triangle"/>
-          </a:ln>
-        </p:spPr>
-        <p:style>
-          <a:lnRef idx="1">
-            <a:schemeClr val="accent1"/>
-          </a:lnRef>
-          <a:fillRef idx="0">
-            <a:schemeClr val="accent1"/>
-          </a:fillRef>
-          <a:effectRef idx="0">
-            <a:schemeClr val="accent1"/>
-          </a:effectRef>
-          <a:fontRef idx="minor">
-            <a:schemeClr val="tx1"/>
-          </a:fontRef>
-        </p:style>
-      </p:cxnSp>
-      <p:cxnSp>
-        <p:nvCxnSpPr>
-          <p:cNvPr id="18" name="Gerade Verbindung mit Pfeil 17">
-            <a:extLst>
-              <a:ext uri="{FF2B5EF4-FFF2-40B4-BE49-F238E27FC236}">
-                <a16:creationId xmlns:a16="http://schemas.microsoft.com/office/drawing/2014/main" id="{84A84A04-3469-8540-B43A-3682F2772B27}"/>
-              </a:ext>
-            </a:extLst>
-          </p:cNvPr>
-          <p:cNvCxnSpPr>
-            <a:stCxn id="5" idx="3"/>
-            <a:endCxn id="4" idx="1"/>
-          </p:cNvCxnSpPr>
-          <p:nvPr/>
-        </p:nvCxnSpPr>
-        <p:spPr>
-          <a:xfrm>
-            <a:off x="7264401" y="3708400"/>
-            <a:ext cx="355599" cy="0"/>
-          </a:xfrm>
-          <a:prstGeom prst="straightConnector1">
-            <a:avLst/>
-          </a:prstGeom>
-          <a:ln>
-            <a:tailEnd type="triangle"/>
-          </a:ln>
-        </p:spPr>
-        <p:style>
-          <a:lnRef idx="1">
-            <a:schemeClr val="accent1"/>
-          </a:lnRef>
-          <a:fillRef idx="0">
-            <a:schemeClr val="accent1"/>
-          </a:fillRef>
-          <a:effectRef idx="0">
-            <a:schemeClr val="accent1"/>
-          </a:effectRef>
-          <a:fontRef idx="minor">
-            <a:schemeClr val="tx1"/>
-          </a:fontRef>
-        </p:style>
-      </p:cxnSp>
+              <a:t>Artifact</a:t>
+            </a:r>
+            <a:r>
+              <a:rPr lang="de-DE" dirty="0"/>
+              <a:t> in Nexus. Nimmt es von Nexus in .m2 und vom .m2 ins Projekt. </a:t>
+            </a:r>
+            <a:r>
+              <a:rPr lang="de-DE" dirty="0" err="1"/>
+              <a:t>Artifakt</a:t>
+            </a:r>
+            <a:r>
+              <a:rPr lang="de-DE" dirty="0"/>
+              <a:t> bleibt nun in .m2 =&gt; später braucht </a:t>
+            </a:r>
+            <a:r>
+              <a:rPr lang="de-DE" dirty="0" err="1"/>
+              <a:t>mvn</a:t>
+            </a:r>
+            <a:r>
+              <a:rPr lang="de-DE" dirty="0"/>
+              <a:t> nicht in Nexus dieses </a:t>
+            </a:r>
+            <a:r>
+              <a:rPr lang="de-DE" dirty="0" err="1"/>
+              <a:t>Artifakt</a:t>
+            </a:r>
+            <a:r>
+              <a:rPr lang="de-DE" dirty="0"/>
+              <a:t> zu suchen</a:t>
+            </a:r>
+          </a:p>
+        </p:txBody>
+      </p:sp>
     </p:spTree>
     <p:extLst>
       <p:ext uri="{BB962C8B-B14F-4D97-AF65-F5344CB8AC3E}">
-        <p14:creationId xmlns:p14="http://schemas.microsoft.com/office/powerpoint/2010/main" val="1943288687"/>
+        <p14:creationId xmlns:p14="http://schemas.microsoft.com/office/powerpoint/2010/main" val="1966278327"/>
       </p:ext>
     </p:extLst>
   </p:cSld>
@@ -5102,24 +4491,88 @@
       </p:grpSpPr>
       <p:sp>
         <p:nvSpPr>
-          <p:cNvPr id="4" name="Rechteck 3">
-            <a:extLst>
-              <a:ext uri="{FF2B5EF4-FFF2-40B4-BE49-F238E27FC236}">
-                <a16:creationId xmlns:a16="http://schemas.microsoft.com/office/drawing/2014/main" id="{0A32F08E-D901-D54B-A3C2-945CBEED43D7}"/>
-              </a:ext>
-            </a:extLst>
-          </p:cNvPr>
-          <p:cNvSpPr/>
+          <p:cNvPr id="2" name="Titel 1">
+            <a:extLst>
+              <a:ext uri="{FF2B5EF4-FFF2-40B4-BE49-F238E27FC236}">
+                <a16:creationId xmlns:a16="http://schemas.microsoft.com/office/drawing/2014/main" id="{137A9ED5-6997-424E-8033-944DAA60D520}"/>
+              </a:ext>
+            </a:extLst>
+          </p:cNvPr>
+          <p:cNvSpPr>
+            <a:spLocks noGrp="1"/>
+          </p:cNvSpPr>
+          <p:nvPr>
+            <p:ph type="title"/>
+          </p:nvPr>
+        </p:nvSpPr>
+        <p:spPr/>
+        <p:txBody>
+          <a:bodyPr/>
+          <a:lstStyle/>
+          <a:p>
+            <a:r>
+              <a:rPr lang="de-DE" b="1" dirty="0"/>
+              <a:t>MAVEN </a:t>
+            </a:r>
+            <a:r>
+              <a:rPr lang="de-DE" b="1" dirty="0" err="1"/>
+              <a:t>Lifecycle</a:t>
+            </a:r>
+            <a:endParaRPr lang="de-DE" b="1" dirty="0"/>
+          </a:p>
+        </p:txBody>
+      </p:sp>
+      <p:pic>
+        <p:nvPicPr>
+          <p:cNvPr id="4" name="Grafik 3">
+            <a:extLst>
+              <a:ext uri="{FF2B5EF4-FFF2-40B4-BE49-F238E27FC236}">
+                <a16:creationId xmlns:a16="http://schemas.microsoft.com/office/drawing/2014/main" id="{6CD0F691-46EC-2C46-9CAF-0A836F643AD2}"/>
+              </a:ext>
+            </a:extLst>
+          </p:cNvPr>
+          <p:cNvPicPr>
+            <a:picLocks noChangeAspect="1"/>
+          </p:cNvPicPr>
           <p:nvPr/>
-        </p:nvSpPr>
+        </p:nvPicPr>
+        <p:blipFill>
+          <a:blip r:embed="rId2"/>
+          <a:stretch>
+            <a:fillRect/>
+          </a:stretch>
+        </p:blipFill>
         <p:spPr>
           <a:xfrm>
-            <a:off x="2065867" y="4622799"/>
-            <a:ext cx="3403600" cy="1608667"/>
+            <a:off x="838199" y="1690688"/>
+            <a:ext cx="6091239" cy="5039436"/>
           </a:xfrm>
           <a:prstGeom prst="rect">
             <a:avLst/>
           </a:prstGeom>
+        </p:spPr>
+      </p:pic>
+      <p:sp>
+        <p:nvSpPr>
+          <p:cNvPr id="5" name="Rechteck 4">
+            <a:extLst>
+              <a:ext uri="{FF2B5EF4-FFF2-40B4-BE49-F238E27FC236}">
+                <a16:creationId xmlns:a16="http://schemas.microsoft.com/office/drawing/2014/main" id="{964C4936-972C-8C49-8DE2-774DAC22DF93}"/>
+              </a:ext>
+            </a:extLst>
+          </p:cNvPr>
+          <p:cNvSpPr/>
+          <p:nvPr/>
+        </p:nvSpPr>
+        <p:spPr>
+          <a:xfrm>
+            <a:off x="7058025" y="1690688"/>
+            <a:ext cx="4879975" cy="5039436"/>
+          </a:xfrm>
+          <a:prstGeom prst="rect">
+            <a:avLst/>
+          </a:prstGeom>
+          <a:noFill/>
         </p:spPr>
         <p:style>
           <a:lnRef idx="2">
@@ -5141,171 +4594,426 @@
           <a:bodyPr rtlCol="0" anchor="ctr"/>
           <a:lstStyle/>
           <a:p>
-            <a:pPr algn="ctr"/>
-            <a:r>
-              <a:rPr lang="de-DE" dirty="0"/>
-              <a:t>dein </a:t>
-            </a:r>
-            <a:r>
-              <a:rPr lang="de-DE" dirty="0" err="1"/>
-              <a:t>Artifact</a:t>
-            </a:r>
-            <a:endParaRPr lang="de-DE" dirty="0"/>
-          </a:p>
-        </p:txBody>
-      </p:sp>
-      <p:sp>
-        <p:nvSpPr>
-          <p:cNvPr id="5" name="Wolke 4">
-            <a:extLst>
-              <a:ext uri="{FF2B5EF4-FFF2-40B4-BE49-F238E27FC236}">
-                <a16:creationId xmlns:a16="http://schemas.microsoft.com/office/drawing/2014/main" id="{42AB6846-1A55-AD4F-9D7F-4AEEC9B264A1}"/>
-              </a:ext>
-            </a:extLst>
-          </p:cNvPr>
-          <p:cNvSpPr/>
-          <p:nvPr/>
-        </p:nvSpPr>
-        <p:spPr>
-          <a:xfrm>
-            <a:off x="1490133" y="423333"/>
-            <a:ext cx="5384800" cy="2116667"/>
-          </a:xfrm>
-          <a:prstGeom prst="cloud">
-            <a:avLst/>
-          </a:prstGeom>
-        </p:spPr>
-        <p:style>
-          <a:lnRef idx="2">
-            <a:schemeClr val="accent1">
-              <a:shade val="50000"/>
-            </a:schemeClr>
-          </a:lnRef>
-          <a:fillRef idx="1">
-            <a:schemeClr val="accent1"/>
-          </a:fillRef>
-          <a:effectRef idx="0">
-            <a:schemeClr val="accent1"/>
-          </a:effectRef>
-          <a:fontRef idx="minor">
-            <a:schemeClr val="lt1"/>
-          </a:fontRef>
-        </p:style>
-        <p:txBody>
-          <a:bodyPr rtlCol="0" anchor="ctr"/>
-          <a:lstStyle/>
-          <a:p>
-            <a:pPr algn="ctr"/>
-            <a:r>
-              <a:rPr lang="de-DE" dirty="0"/>
-              <a:t>Nexus</a:t>
-            </a:r>
-          </a:p>
-        </p:txBody>
-      </p:sp>
-      <p:cxnSp>
-        <p:nvCxnSpPr>
-          <p:cNvPr id="7" name="Gerade Verbindung mit Pfeil 6">
-            <a:extLst>
-              <a:ext uri="{FF2B5EF4-FFF2-40B4-BE49-F238E27FC236}">
-                <a16:creationId xmlns:a16="http://schemas.microsoft.com/office/drawing/2014/main" id="{B900F8CA-7955-B049-8C16-DF441952675E}"/>
-              </a:ext>
-            </a:extLst>
-          </p:cNvPr>
-          <p:cNvCxnSpPr>
-            <a:stCxn id="4" idx="0"/>
-          </p:cNvCxnSpPr>
-          <p:nvPr/>
-        </p:nvCxnSpPr>
-        <p:spPr>
-          <a:xfrm flipV="1">
-            <a:off x="3767667" y="2540000"/>
-            <a:ext cx="194733" cy="2082799"/>
-          </a:xfrm>
-          <a:prstGeom prst="straightConnector1">
-            <a:avLst/>
-          </a:prstGeom>
-          <a:ln>
-            <a:tailEnd type="triangle"/>
-          </a:ln>
-        </p:spPr>
-        <p:style>
-          <a:lnRef idx="1">
-            <a:schemeClr val="accent1"/>
-          </a:lnRef>
-          <a:fillRef idx="0">
-            <a:schemeClr val="accent1"/>
-          </a:fillRef>
-          <a:effectRef idx="0">
-            <a:schemeClr val="accent1"/>
-          </a:effectRef>
-          <a:fontRef idx="minor">
-            <a:schemeClr val="tx1"/>
-          </a:fontRef>
-        </p:style>
-      </p:cxnSp>
-      <p:sp>
-        <p:nvSpPr>
-          <p:cNvPr id="8" name="Rechteck 7">
-            <a:extLst>
-              <a:ext uri="{FF2B5EF4-FFF2-40B4-BE49-F238E27FC236}">
-                <a16:creationId xmlns:a16="http://schemas.microsoft.com/office/drawing/2014/main" id="{0558D60C-E296-3F4F-9FC6-F158B909C285}"/>
-              </a:ext>
-            </a:extLst>
-          </p:cNvPr>
-          <p:cNvSpPr/>
-          <p:nvPr/>
-        </p:nvSpPr>
-        <p:spPr>
-          <a:xfrm>
-            <a:off x="3962400" y="2997200"/>
-            <a:ext cx="4809067" cy="711200"/>
-          </a:xfrm>
-          <a:prstGeom prst="rect">
-            <a:avLst/>
-          </a:prstGeom>
-        </p:spPr>
-        <p:style>
-          <a:lnRef idx="2">
-            <a:schemeClr val="accent1">
-              <a:shade val="50000"/>
-            </a:schemeClr>
-          </a:lnRef>
-          <a:fillRef idx="1">
-            <a:schemeClr val="accent1"/>
-          </a:fillRef>
-          <a:effectRef idx="0">
-            <a:schemeClr val="accent1"/>
-          </a:effectRef>
-          <a:fontRef idx="minor">
-            <a:schemeClr val="lt1"/>
-          </a:fontRef>
-        </p:style>
-        <p:txBody>
-          <a:bodyPr rtlCol="0" anchor="ctr"/>
-          <a:lstStyle/>
-          <a:p>
-            <a:pPr algn="ctr"/>
-            <a:r>
-              <a:rPr lang="de-DE" dirty="0" err="1"/>
-              <a:t>distributionManagement</a:t>
-            </a:r>
-            <a:r>
-              <a:rPr lang="de-DE" dirty="0"/>
+            <a:pPr marL="285750" indent="-285750">
+              <a:buFont typeface="Arial" panose="020B0604020202020204" pitchFamily="34" charset="0"/>
+              <a:buChar char="•"/>
+            </a:pPr>
+            <a:r>
+              <a:rPr lang="de-DE" dirty="0">
+                <a:solidFill>
+                  <a:schemeClr val="tx1"/>
+                </a:solidFill>
+              </a:rPr>
+              <a:t>Clean = löscht </a:t>
+            </a:r>
+            <a:r>
+              <a:rPr lang="de-DE" dirty="0" err="1">
+                <a:solidFill>
+                  <a:schemeClr val="tx1"/>
+                </a:solidFill>
+              </a:rPr>
+              <a:t>target</a:t>
+            </a:r>
+            <a:endParaRPr lang="de-DE" dirty="0">
+              <a:solidFill>
+                <a:schemeClr val="tx1"/>
+              </a:solidFill>
+            </a:endParaRPr>
+          </a:p>
+          <a:p>
+            <a:pPr marL="285750" indent="-285750">
+              <a:buFont typeface="Arial" panose="020B0604020202020204" pitchFamily="34" charset="0"/>
+              <a:buChar char="•"/>
+            </a:pPr>
+            <a:r>
+              <a:rPr lang="de-DE" dirty="0" err="1">
+                <a:solidFill>
+                  <a:schemeClr val="tx1"/>
+                </a:solidFill>
+              </a:rPr>
+              <a:t>Validate</a:t>
+            </a:r>
+            <a:r>
+              <a:rPr lang="de-DE" dirty="0">
+                <a:solidFill>
+                  <a:schemeClr val="tx1"/>
+                </a:solidFill>
+              </a:rPr>
+              <a:t>= </a:t>
+            </a:r>
+            <a:r>
+              <a:rPr lang="de-DE" dirty="0" err="1">
+                <a:solidFill>
+                  <a:schemeClr val="tx1"/>
+                </a:solidFill>
+              </a:rPr>
+              <a:t>überpruft</a:t>
+            </a:r>
+            <a:r>
+              <a:rPr lang="de-DE" dirty="0">
+                <a:solidFill>
+                  <a:schemeClr val="tx1"/>
+                </a:solidFill>
+              </a:rPr>
+              <a:t> ob </a:t>
+            </a:r>
+            <a:r>
+              <a:rPr lang="de-DE" dirty="0" err="1">
+                <a:solidFill>
+                  <a:schemeClr val="tx1"/>
+                </a:solidFill>
+              </a:rPr>
+              <a:t>java</a:t>
+            </a:r>
+            <a:r>
+              <a:rPr lang="de-DE" dirty="0">
+                <a:solidFill>
+                  <a:schemeClr val="tx1"/>
+                </a:solidFill>
+              </a:rPr>
+              <a:t> </a:t>
+            </a:r>
+            <a:r>
+              <a:rPr lang="de-DE" dirty="0" err="1">
+                <a:solidFill>
+                  <a:schemeClr val="tx1"/>
+                </a:solidFill>
+              </a:rPr>
+              <a:t>validierung</a:t>
+            </a:r>
+            <a:r>
+              <a:rPr lang="de-DE" dirty="0">
+                <a:solidFill>
+                  <a:schemeClr val="tx1"/>
+                </a:solidFill>
+              </a:rPr>
+              <a:t> richtig sind</a:t>
+            </a:r>
+          </a:p>
+          <a:p>
+            <a:pPr marL="285750" indent="-285750">
+              <a:buFont typeface="Arial" panose="020B0604020202020204" pitchFamily="34" charset="0"/>
+              <a:buChar char="•"/>
+            </a:pPr>
+            <a:r>
+              <a:rPr lang="de-DE" dirty="0" err="1">
+                <a:solidFill>
+                  <a:schemeClr val="tx1"/>
+                </a:solidFill>
+              </a:rPr>
+              <a:t>Compile</a:t>
+            </a:r>
+            <a:r>
+              <a:rPr lang="de-DE" dirty="0">
+                <a:solidFill>
+                  <a:schemeClr val="tx1"/>
+                </a:solidFill>
+              </a:rPr>
+              <a:t>= </a:t>
+            </a:r>
+            <a:r>
+              <a:rPr lang="de-DE" dirty="0" err="1">
+                <a:solidFill>
+                  <a:schemeClr val="tx1"/>
+                </a:solidFill>
+              </a:rPr>
+              <a:t>java</a:t>
+            </a:r>
+            <a:r>
+              <a:rPr lang="de-DE" dirty="0">
+                <a:solidFill>
+                  <a:schemeClr val="tx1"/>
+                </a:solidFill>
+              </a:rPr>
+              <a:t> </a:t>
+            </a:r>
+            <a:r>
+              <a:rPr lang="de-DE" dirty="0" err="1">
+                <a:solidFill>
+                  <a:schemeClr val="tx1"/>
+                </a:solidFill>
+              </a:rPr>
+              <a:t>code</a:t>
+            </a:r>
+            <a:r>
+              <a:rPr lang="de-DE" dirty="0">
+                <a:solidFill>
+                  <a:schemeClr val="tx1"/>
+                </a:solidFill>
+              </a:rPr>
               <a:t> in </a:t>
             </a:r>
             <a:r>
-              <a:rPr lang="de-DE" dirty="0" err="1"/>
-              <a:t>pom.xml</a:t>
-            </a:r>
-            <a:endParaRPr lang="de-DE" dirty="0"/>
+              <a:rPr lang="de-DE" dirty="0" err="1">
+                <a:solidFill>
+                  <a:schemeClr val="tx1"/>
+                </a:solidFill>
+              </a:rPr>
+              <a:t>machine</a:t>
+            </a:r>
+            <a:r>
+              <a:rPr lang="de-DE" dirty="0">
+                <a:solidFill>
+                  <a:schemeClr val="tx1"/>
+                </a:solidFill>
+              </a:rPr>
+              <a:t> </a:t>
+            </a:r>
+            <a:r>
+              <a:rPr lang="de-DE" dirty="0" err="1">
+                <a:solidFill>
+                  <a:schemeClr val="tx1"/>
+                </a:solidFill>
+              </a:rPr>
+              <a:t>code</a:t>
+            </a:r>
+            <a:r>
+              <a:rPr lang="de-DE" dirty="0">
+                <a:solidFill>
+                  <a:schemeClr val="tx1"/>
+                </a:solidFill>
+              </a:rPr>
+              <a:t> / </a:t>
+            </a:r>
+            <a:r>
+              <a:rPr lang="de-DE" dirty="0" err="1">
+                <a:solidFill>
+                  <a:schemeClr val="tx1"/>
+                </a:solidFill>
+              </a:rPr>
+              <a:t>binary</a:t>
+            </a:r>
+            <a:r>
+              <a:rPr lang="de-DE" dirty="0">
+                <a:solidFill>
+                  <a:schemeClr val="tx1"/>
+                </a:solidFill>
+              </a:rPr>
+              <a:t> oder .</a:t>
+            </a:r>
+            <a:r>
+              <a:rPr lang="de-DE" dirty="0" err="1">
+                <a:solidFill>
+                  <a:schemeClr val="tx1"/>
+                </a:solidFill>
+              </a:rPr>
+              <a:t>class</a:t>
+            </a:r>
+            <a:endParaRPr lang="de-DE" dirty="0">
+              <a:solidFill>
+                <a:schemeClr val="tx1"/>
+              </a:solidFill>
+            </a:endParaRPr>
+          </a:p>
+          <a:p>
+            <a:pPr marL="285750" indent="-285750">
+              <a:buFont typeface="Arial" panose="020B0604020202020204" pitchFamily="34" charset="0"/>
+              <a:buChar char="•"/>
+            </a:pPr>
+            <a:r>
+              <a:rPr lang="de-DE" dirty="0">
+                <a:solidFill>
+                  <a:schemeClr val="tx1"/>
+                </a:solidFill>
+              </a:rPr>
+              <a:t>Test = führt Test klasse aus</a:t>
+            </a:r>
+          </a:p>
+          <a:p>
+            <a:pPr marL="285750" indent="-285750">
+              <a:buFont typeface="Arial" panose="020B0604020202020204" pitchFamily="34" charset="0"/>
+              <a:buChar char="•"/>
+            </a:pPr>
+            <a:r>
+              <a:rPr lang="de-DE" dirty="0">
+                <a:solidFill>
+                  <a:schemeClr val="tx1"/>
+                </a:solidFill>
+              </a:rPr>
+              <a:t> </a:t>
+            </a:r>
+            <a:r>
+              <a:rPr lang="de-DE" dirty="0" err="1">
+                <a:solidFill>
+                  <a:schemeClr val="tx1"/>
+                </a:solidFill>
+              </a:rPr>
+              <a:t>package</a:t>
+            </a:r>
+            <a:r>
+              <a:rPr lang="de-DE" dirty="0">
+                <a:solidFill>
+                  <a:schemeClr val="tx1"/>
+                </a:solidFill>
+              </a:rPr>
+              <a:t> = komprimieren in </a:t>
+            </a:r>
+            <a:r>
+              <a:rPr lang="de-DE" dirty="0" err="1">
+                <a:solidFill>
+                  <a:schemeClr val="tx1"/>
+                </a:solidFill>
+              </a:rPr>
+              <a:t>jar</a:t>
+            </a:r>
+            <a:r>
+              <a:rPr lang="de-DE" dirty="0">
+                <a:solidFill>
+                  <a:schemeClr val="tx1"/>
+                </a:solidFill>
+              </a:rPr>
+              <a:t>/war/</a:t>
+            </a:r>
+            <a:r>
+              <a:rPr lang="de-DE" dirty="0" err="1">
+                <a:solidFill>
+                  <a:schemeClr val="tx1"/>
+                </a:solidFill>
+              </a:rPr>
+              <a:t>ear</a:t>
+            </a:r>
+            <a:endParaRPr lang="de-DE" dirty="0">
+              <a:solidFill>
+                <a:schemeClr val="tx1"/>
+              </a:solidFill>
+            </a:endParaRPr>
+          </a:p>
+          <a:p>
+            <a:pPr marL="285750" indent="-285750">
+              <a:buFont typeface="Arial" panose="020B0604020202020204" pitchFamily="34" charset="0"/>
+              <a:buChar char="•"/>
+            </a:pPr>
+            <a:r>
+              <a:rPr lang="de-DE" dirty="0" err="1">
+                <a:solidFill>
+                  <a:schemeClr val="tx1"/>
+                </a:solidFill>
+              </a:rPr>
+              <a:t>Verify</a:t>
+            </a:r>
+            <a:r>
+              <a:rPr lang="de-DE" dirty="0">
+                <a:solidFill>
+                  <a:schemeClr val="tx1"/>
+                </a:solidFill>
+              </a:rPr>
+              <a:t>=</a:t>
+            </a:r>
+          </a:p>
+          <a:p>
+            <a:pPr marL="285750" indent="-285750">
+              <a:buFont typeface="Arial" panose="020B0604020202020204" pitchFamily="34" charset="0"/>
+              <a:buChar char="•"/>
+            </a:pPr>
+            <a:r>
+              <a:rPr lang="de-DE" dirty="0" err="1">
+                <a:solidFill>
+                  <a:schemeClr val="tx1"/>
+                </a:solidFill>
+              </a:rPr>
+              <a:t>Install</a:t>
+            </a:r>
+            <a:r>
+              <a:rPr lang="de-DE" dirty="0">
+                <a:solidFill>
+                  <a:schemeClr val="tx1"/>
+                </a:solidFill>
+              </a:rPr>
+              <a:t> = komprimierte </a:t>
+            </a:r>
+            <a:r>
+              <a:rPr lang="de-DE" dirty="0" err="1">
+                <a:solidFill>
+                  <a:schemeClr val="tx1"/>
+                </a:solidFill>
+              </a:rPr>
+              <a:t>file</a:t>
+            </a:r>
+            <a:r>
+              <a:rPr lang="de-DE" dirty="0">
+                <a:solidFill>
+                  <a:schemeClr val="tx1"/>
+                </a:solidFill>
+              </a:rPr>
+              <a:t> in .m2 </a:t>
+            </a:r>
+            <a:r>
+              <a:rPr lang="de-DE" dirty="0" err="1">
+                <a:solidFill>
+                  <a:schemeClr val="tx1"/>
+                </a:solidFill>
+              </a:rPr>
+              <a:t>repo</a:t>
+            </a:r>
+            <a:r>
+              <a:rPr lang="de-DE" dirty="0">
+                <a:solidFill>
+                  <a:schemeClr val="tx1"/>
+                </a:solidFill>
+              </a:rPr>
+              <a:t> schieben</a:t>
+            </a:r>
+          </a:p>
+          <a:p>
+            <a:pPr marL="285750" indent="-285750">
+              <a:buFont typeface="Arial" panose="020B0604020202020204" pitchFamily="34" charset="0"/>
+              <a:buChar char="•"/>
+            </a:pPr>
+            <a:r>
+              <a:rPr lang="de-DE" dirty="0" err="1">
+                <a:solidFill>
+                  <a:schemeClr val="tx1"/>
+                </a:solidFill>
+              </a:rPr>
+              <a:t>Deploy</a:t>
+            </a:r>
+            <a:r>
+              <a:rPr lang="de-DE" dirty="0">
+                <a:solidFill>
+                  <a:schemeClr val="tx1"/>
+                </a:solidFill>
+              </a:rPr>
+              <a:t> = </a:t>
+            </a:r>
+            <a:r>
+              <a:rPr lang="de-DE" dirty="0" err="1">
+                <a:solidFill>
+                  <a:schemeClr val="tx1"/>
+                </a:solidFill>
+              </a:rPr>
+              <a:t>artifact</a:t>
+            </a:r>
+            <a:r>
+              <a:rPr lang="de-DE" dirty="0">
+                <a:solidFill>
+                  <a:schemeClr val="tx1"/>
+                </a:solidFill>
+              </a:rPr>
+              <a:t> in </a:t>
+            </a:r>
+            <a:r>
+              <a:rPr lang="de-DE" dirty="0" err="1">
+                <a:solidFill>
+                  <a:schemeClr val="tx1"/>
+                </a:solidFill>
+              </a:rPr>
+              <a:t>server</a:t>
+            </a:r>
+            <a:r>
+              <a:rPr lang="de-DE" dirty="0">
+                <a:solidFill>
+                  <a:schemeClr val="tx1"/>
+                </a:solidFill>
+              </a:rPr>
+              <a:t> hochladen</a:t>
+            </a:r>
           </a:p>
         </p:txBody>
       </p:sp>
     </p:spTree>
     <p:extLst>
       <p:ext uri="{BB962C8B-B14F-4D97-AF65-F5344CB8AC3E}">
-        <p14:creationId xmlns:p14="http://schemas.microsoft.com/office/powerpoint/2010/main" val="1495788190"/>
+        <p14:creationId xmlns:p14="http://schemas.microsoft.com/office/powerpoint/2010/main" val="2448547759"/>
       </p:ext>
     </p:extLst>
   </p:cSld>
@@ -5337,7 +5045,7 @@
           <p:cNvPr id="2" name="Titel 1">
             <a:extLst>
               <a:ext uri="{FF2B5EF4-FFF2-40B4-BE49-F238E27FC236}">
-                <a16:creationId xmlns:a16="http://schemas.microsoft.com/office/drawing/2014/main" id="{C8097655-36E4-E74C-B6C8-A90D68E44643}"/>
+                <a16:creationId xmlns:a16="http://schemas.microsoft.com/office/drawing/2014/main" id="{E8F588C2-A092-B44C-82A1-BA351B91C51D}"/>
               </a:ext>
             </a:extLst>
           </p:cNvPr>
@@ -5355,13 +5063,8 @@
           <a:p>
             <a:r>
               <a:rPr lang="de-DE" dirty="0"/>
-              <a:t>MAVEN + NEXUS </a:t>
-            </a:r>
-            <a:r>
-              <a:rPr lang="de-DE" dirty="0" err="1"/>
-              <a:t>Lifecycle</a:t>
-            </a:r>
-            <a:endParaRPr lang="de-DE" dirty="0"/>
+              <a:t>Project tags</a:t>
+            </a:r>
           </a:p>
         </p:txBody>
       </p:sp>
@@ -5370,7 +5073,7 @@
           <p:cNvPr id="3" name="Inhaltsplatzhalter 2">
             <a:extLst>
               <a:ext uri="{FF2B5EF4-FFF2-40B4-BE49-F238E27FC236}">
-                <a16:creationId xmlns:a16="http://schemas.microsoft.com/office/drawing/2014/main" id="{FCD11410-8EA8-154E-A6CA-5A8506E645C2}"/>
+                <a16:creationId xmlns:a16="http://schemas.microsoft.com/office/drawing/2014/main" id="{64B17A4F-8BC5-3448-BC7B-6261D20AE171}"/>
               </a:ext>
             </a:extLst>
           </p:cNvPr>
@@ -5386,173 +5089,25 @@
           <a:bodyPr/>
           <a:lstStyle/>
           <a:p>
-            <a:pPr marL="514350" indent="-514350">
-              <a:buAutoNum type="arabicPeriod"/>
-            </a:pPr>
-            <a:r>
-              <a:rPr lang="de-DE" dirty="0"/>
-              <a:t>Suche </a:t>
-            </a:r>
-            <a:r>
-              <a:rPr lang="de-DE" dirty="0" err="1"/>
-              <a:t>dependecy</a:t>
-            </a:r>
-            <a:r>
-              <a:rPr lang="de-DE" dirty="0"/>
-              <a:t> im Netz für eine gewünschte </a:t>
-            </a:r>
-            <a:r>
-              <a:rPr lang="de-DE" dirty="0" err="1"/>
-              <a:t>library</a:t>
-            </a:r>
-            <a:endParaRPr lang="de-DE" dirty="0"/>
-          </a:p>
-          <a:p>
-            <a:pPr marL="514350" indent="-514350">
-              <a:buAutoNum type="arabicPeriod"/>
-            </a:pPr>
-            <a:r>
-              <a:rPr lang="de-DE" dirty="0" err="1"/>
-              <a:t>Dependency</a:t>
-            </a:r>
-            <a:r>
-              <a:rPr lang="de-DE" dirty="0"/>
-              <a:t> Tag in </a:t>
-            </a:r>
-            <a:r>
-              <a:rPr lang="de-DE" dirty="0" err="1"/>
-              <a:t>Pom.xml</a:t>
-            </a:r>
-            <a:r>
-              <a:rPr lang="de-DE" dirty="0"/>
-              <a:t> eintragen</a:t>
-            </a:r>
-          </a:p>
-          <a:p>
-            <a:pPr marL="514350" indent="-514350">
-              <a:buAutoNum type="arabicPeriod"/>
-            </a:pPr>
-            <a:r>
-              <a:rPr lang="de-DE" dirty="0" err="1"/>
-              <a:t>Maven</a:t>
-            </a:r>
-            <a:r>
-              <a:rPr lang="de-DE" dirty="0"/>
-              <a:t> sucht </a:t>
-            </a:r>
-            <a:r>
-              <a:rPr lang="de-DE" dirty="0" err="1"/>
-              <a:t>jar</a:t>
-            </a:r>
-            <a:r>
-              <a:rPr lang="de-DE" dirty="0"/>
-              <a:t> von </a:t>
-            </a:r>
-            <a:r>
-              <a:rPr lang="de-DE" dirty="0" err="1"/>
-              <a:t>dependency</a:t>
-            </a:r>
-            <a:r>
-              <a:rPr lang="de-DE" dirty="0"/>
-              <a:t> in .m2 </a:t>
-            </a:r>
-            <a:r>
-              <a:rPr lang="de-DE" dirty="0" err="1"/>
-              <a:t>repo</a:t>
-            </a:r>
-            <a:r>
-              <a:rPr lang="de-DE" dirty="0"/>
-              <a:t>(lokal </a:t>
-            </a:r>
-            <a:r>
-              <a:rPr lang="de-DE" dirty="0" err="1"/>
-              <a:t>repo</a:t>
-            </a:r>
-            <a:r>
-              <a:rPr lang="de-DE" dirty="0"/>
-              <a:t>)</a:t>
-            </a:r>
-          </a:p>
-          <a:p>
-            <a:pPr marL="514350" indent="-514350">
-              <a:buAutoNum type="arabicPeriod"/>
-            </a:pPr>
-            <a:r>
-              <a:rPr lang="de-DE" dirty="0"/>
-              <a:t>Ist </a:t>
-            </a:r>
-            <a:r>
-              <a:rPr lang="de-DE" dirty="0" err="1"/>
-              <a:t>Dependency</a:t>
-            </a:r>
-            <a:r>
-              <a:rPr lang="de-DE" dirty="0"/>
-              <a:t> drin dann nimmt </a:t>
-            </a:r>
-            <a:r>
-              <a:rPr lang="de-DE" dirty="0" err="1"/>
-              <a:t>mvn</a:t>
-            </a:r>
-            <a:r>
-              <a:rPr lang="de-DE" dirty="0"/>
-              <a:t> dir </a:t>
-            </a:r>
-            <a:r>
-              <a:rPr lang="de-DE" dirty="0" err="1"/>
-              <a:t>jar</a:t>
-            </a:r>
-            <a:r>
-              <a:rPr lang="de-DE" dirty="0"/>
-              <a:t> davon und lege es im Projekt ab</a:t>
-            </a:r>
-          </a:p>
-          <a:p>
-            <a:pPr marL="514350" indent="-514350">
-              <a:buAutoNum type="arabicPeriod"/>
-            </a:pPr>
-            <a:r>
-              <a:rPr lang="de-DE" dirty="0"/>
-              <a:t>Wenn nicht dann sucht </a:t>
-            </a:r>
-            <a:r>
-              <a:rPr lang="de-DE" dirty="0" err="1"/>
-              <a:t>mvn</a:t>
-            </a:r>
-            <a:r>
-              <a:rPr lang="de-DE" dirty="0"/>
-              <a:t> </a:t>
-            </a:r>
-            <a:r>
-              <a:rPr lang="de-DE" dirty="0" err="1"/>
-              <a:t>Artifact</a:t>
-            </a:r>
-            <a:r>
-              <a:rPr lang="de-DE" dirty="0"/>
-              <a:t> in Nexus. Nimmt es von Nexus in .m2 und vom .m2 ins Projekt. </a:t>
-            </a:r>
-            <a:r>
-              <a:rPr lang="de-DE" dirty="0" err="1"/>
-              <a:t>Artifakt</a:t>
-            </a:r>
-            <a:r>
-              <a:rPr lang="de-DE" dirty="0"/>
-              <a:t> bleibt nun in .m2 =&gt; später braucht </a:t>
-            </a:r>
-            <a:r>
-              <a:rPr lang="de-DE" dirty="0" err="1"/>
-              <a:t>mvn</a:t>
-            </a:r>
-            <a:r>
-              <a:rPr lang="de-DE" dirty="0"/>
-              <a:t> nicht in Nexus dieses </a:t>
-            </a:r>
-            <a:r>
-              <a:rPr lang="de-DE" dirty="0" err="1"/>
-              <a:t>Artifakt</a:t>
-            </a:r>
-            <a:r>
-              <a:rPr lang="de-DE" dirty="0"/>
-              <a:t> zu suchen</a:t>
+            <a:r>
+              <a:rPr lang="de-DE" dirty="0"/>
+              <a:t>&lt;</a:t>
+            </a:r>
+            <a:r>
+              <a:rPr lang="de-DE" dirty="0" err="1"/>
+              <a:t>fileName</a:t>
+            </a:r>
+            <a:r>
+              <a:rPr lang="de-DE" dirty="0"/>
+              <a:t>&gt; = </a:t>
+            </a:r>
+            <a:r>
+              <a:rPr lang="de-DE" dirty="0" err="1"/>
+              <a:t>Eklärung</a:t>
+            </a:r>
+            <a:r>
+              <a:rPr lang="de-DE" dirty="0"/>
+              <a:t>..</a:t>
             </a:r>
           </a:p>
         </p:txBody>
@@ -5560,7 +5115,7 @@
     </p:spTree>
     <p:extLst>
       <p:ext uri="{BB962C8B-B14F-4D97-AF65-F5344CB8AC3E}">
-        <p14:creationId xmlns:p14="http://schemas.microsoft.com/office/powerpoint/2010/main" val="1966278327"/>
+        <p14:creationId xmlns:p14="http://schemas.microsoft.com/office/powerpoint/2010/main" val="1827073723"/>
       </p:ext>
     </p:extLst>
   </p:cSld>
@@ -5592,7 +5147,7 @@
           <p:cNvPr id="2" name="Titel 1">
             <a:extLst>
               <a:ext uri="{FF2B5EF4-FFF2-40B4-BE49-F238E27FC236}">
-                <a16:creationId xmlns:a16="http://schemas.microsoft.com/office/drawing/2014/main" id="{137A9ED5-6997-424E-8033-944DAA60D520}"/>
+                <a16:creationId xmlns:a16="http://schemas.microsoft.com/office/drawing/2014/main" id="{B75ED0FA-1381-A947-982D-11CF54EAC611}"/>
               </a:ext>
             </a:extLst>
           </p:cNvPr>
@@ -5609,288 +5164,247 @@
           <a:lstStyle/>
           <a:p>
             <a:r>
+              <a:rPr lang="de-DE" dirty="0" err="1"/>
+              <a:t>Dependency</a:t>
+            </a:r>
+            <a:r>
+              <a:rPr lang="de-DE" dirty="0"/>
+              <a:t> </a:t>
+            </a:r>
+            <a:r>
+              <a:rPr lang="de-DE" dirty="0" err="1"/>
+              <a:t>mechanismus</a:t>
+            </a:r>
+            <a:endParaRPr lang="de-DE" dirty="0"/>
+          </a:p>
+        </p:txBody>
+      </p:sp>
+      <p:sp>
+        <p:nvSpPr>
+          <p:cNvPr id="3" name="Inhaltsplatzhalter 2">
+            <a:extLst>
+              <a:ext uri="{FF2B5EF4-FFF2-40B4-BE49-F238E27FC236}">
+                <a16:creationId xmlns:a16="http://schemas.microsoft.com/office/drawing/2014/main" id="{907A0DF3-A657-FF46-8E60-0F50D4BACABE}"/>
+              </a:ext>
+            </a:extLst>
+          </p:cNvPr>
+          <p:cNvSpPr>
+            <a:spLocks noGrp="1"/>
+          </p:cNvSpPr>
+          <p:nvPr>
+            <p:ph idx="1"/>
+          </p:nvPr>
+        </p:nvSpPr>
+        <p:spPr/>
+        <p:txBody>
+          <a:bodyPr>
+            <a:normAutofit fontScale="85000" lnSpcReduction="20000"/>
+          </a:bodyPr>
+          <a:lstStyle/>
+          <a:p>
+            <a:pPr marL="0" indent="0">
+              <a:buNone/>
+            </a:pPr>
+            <a:r>
+              <a:rPr lang="de-DE" dirty="0" err="1"/>
+              <a:t>Dependency</a:t>
+            </a:r>
+            <a:r>
+              <a:rPr lang="de-DE" dirty="0"/>
+              <a:t> </a:t>
+            </a:r>
+            <a:r>
+              <a:rPr lang="de-DE" dirty="0" err="1"/>
+              <a:t>configurieren</a:t>
+            </a:r>
+            <a:endParaRPr lang="de-DE" dirty="0"/>
+          </a:p>
+          <a:p>
+            <a:pPr marL="0" indent="0">
+              <a:buNone/>
+            </a:pPr>
+            <a:r>
+              <a:rPr lang="de-DE" dirty="0"/>
+              <a:t>&lt;</a:t>
+            </a:r>
+            <a:r>
+              <a:rPr lang="de-DE" dirty="0" err="1"/>
+              <a:t>dependency</a:t>
+            </a:r>
+            <a:r>
+              <a:rPr lang="de-DE" dirty="0"/>
+              <a:t>&gt;</a:t>
+            </a:r>
+            <a:br>
+              <a:rPr lang="de-DE" dirty="0"/>
+            </a:br>
+            <a:r>
+              <a:rPr lang="de-DE" dirty="0"/>
+              <a:t>    &lt;</a:t>
+            </a:r>
+            <a:r>
+              <a:rPr lang="de-DE" dirty="0" err="1"/>
+              <a:t>groupId</a:t>
+            </a:r>
+            <a:r>
+              <a:rPr lang="de-DE" dirty="0"/>
+              <a:t>&gt;</a:t>
+            </a:r>
+            <a:r>
+              <a:rPr lang="de-DE" dirty="0" err="1"/>
+              <a:t>org.junit.jupiter</a:t>
+            </a:r>
+            <a:r>
+              <a:rPr lang="de-DE" dirty="0"/>
+              <a:t>&lt;/</a:t>
+            </a:r>
+            <a:r>
+              <a:rPr lang="de-DE" dirty="0" err="1"/>
+              <a:t>groupId</a:t>
+            </a:r>
+            <a:r>
+              <a:rPr lang="de-DE" dirty="0"/>
+              <a:t>&gt;</a:t>
+            </a:r>
+            <a:br>
+              <a:rPr lang="de-DE" dirty="0"/>
+            </a:br>
+            <a:r>
+              <a:rPr lang="de-DE" dirty="0"/>
+              <a:t>    &lt;</a:t>
+            </a:r>
+            <a:r>
+              <a:rPr lang="de-DE" dirty="0" err="1"/>
+              <a:t>artifactId</a:t>
+            </a:r>
+            <a:r>
+              <a:rPr lang="de-DE" dirty="0"/>
+              <a:t>&gt;</a:t>
+            </a:r>
+            <a:r>
+              <a:rPr lang="de-DE" dirty="0" err="1"/>
+              <a:t>junit</a:t>
+            </a:r>
+            <a:r>
+              <a:rPr lang="de-DE" dirty="0"/>
+              <a:t>-jupiter&lt;/</a:t>
+            </a:r>
+            <a:r>
+              <a:rPr lang="de-DE" dirty="0" err="1"/>
+              <a:t>artifactId</a:t>
+            </a:r>
+            <a:r>
+              <a:rPr lang="de-DE" dirty="0"/>
+              <a:t>&gt;</a:t>
+            </a:r>
+            <a:br>
+              <a:rPr lang="de-DE" dirty="0"/>
+            </a:br>
+            <a:r>
+              <a:rPr lang="de-DE" dirty="0"/>
+              <a:t>    &lt;</a:t>
+            </a:r>
+            <a:r>
+              <a:rPr lang="de-DE" dirty="0" err="1"/>
+              <a:t>version</a:t>
+            </a:r>
+            <a:r>
+              <a:rPr lang="de-DE" dirty="0"/>
+              <a:t>&gt;5.4.2&lt;/</a:t>
+            </a:r>
+            <a:r>
+              <a:rPr lang="de-DE" dirty="0" err="1"/>
+              <a:t>version</a:t>
+            </a:r>
+            <a:r>
+              <a:rPr lang="de-DE" dirty="0"/>
+              <a:t>&gt;</a:t>
+            </a:r>
+            <a:br>
+              <a:rPr lang="de-DE" dirty="0"/>
+            </a:br>
+            <a:r>
+              <a:rPr lang="de-DE" dirty="0"/>
+              <a:t>&lt;/</a:t>
+            </a:r>
+            <a:r>
+              <a:rPr lang="de-DE" dirty="0" err="1"/>
+              <a:t>dependency</a:t>
+            </a:r>
+            <a:r>
+              <a:rPr lang="de-DE" dirty="0"/>
+              <a:t>&gt;</a:t>
+            </a:r>
+          </a:p>
+          <a:p>
+            <a:endParaRPr lang="de-DE" dirty="0"/>
+          </a:p>
+          <a:p>
+            <a:pPr marL="0" indent="0">
+              <a:buNone/>
+            </a:pPr>
+            <a:r>
               <a:rPr lang="de-DE" b="1" dirty="0"/>
-              <a:t>MAVEN </a:t>
-            </a:r>
+              <a:t>Transitivität</a:t>
+            </a:r>
+          </a:p>
+          <a:p>
+            <a:pPr marL="0" indent="0">
+              <a:buNone/>
+            </a:pPr>
+            <a:r>
+              <a:rPr lang="de-DE" dirty="0" err="1"/>
+              <a:t>Mvn</a:t>
+            </a:r>
+            <a:r>
+              <a:rPr lang="de-DE" dirty="0"/>
+              <a:t> holt gewünschte </a:t>
+            </a:r>
+            <a:r>
+              <a:rPr lang="de-DE" dirty="0" err="1"/>
+              <a:t>libray</a:t>
+            </a:r>
+            <a:r>
+              <a:rPr lang="de-DE" dirty="0"/>
+              <a:t> plus </a:t>
+            </a:r>
+            <a:r>
+              <a:rPr lang="de-DE" dirty="0" err="1"/>
+              <a:t>abhängigkeiten</a:t>
+            </a:r>
+            <a:endParaRPr lang="de-DE" dirty="0"/>
+          </a:p>
+          <a:p>
+            <a:pPr marL="0" indent="0">
+              <a:buNone/>
+            </a:pPr>
             <a:r>
               <a:rPr lang="de-DE" b="1" dirty="0" err="1"/>
-              <a:t>Lifecycle</a:t>
+              <a:t>Exclusion</a:t>
             </a:r>
             <a:endParaRPr lang="de-DE" b="1" dirty="0"/>
           </a:p>
-        </p:txBody>
-      </p:sp>
-      <p:pic>
-        <p:nvPicPr>
-          <p:cNvPr id="4" name="Grafik 3">
-            <a:extLst>
-              <a:ext uri="{FF2B5EF4-FFF2-40B4-BE49-F238E27FC236}">
-                <a16:creationId xmlns:a16="http://schemas.microsoft.com/office/drawing/2014/main" id="{6CD0F691-46EC-2C46-9CAF-0A836F643AD2}"/>
-              </a:ext>
-            </a:extLst>
-          </p:cNvPr>
-          <p:cNvPicPr>
-            <a:picLocks noChangeAspect="1"/>
-          </p:cNvPicPr>
-          <p:nvPr/>
-        </p:nvPicPr>
-        <p:blipFill>
-          <a:blip r:embed="rId2"/>
-          <a:stretch>
-            <a:fillRect/>
-          </a:stretch>
-        </p:blipFill>
-        <p:spPr>
-          <a:xfrm>
-            <a:off x="838199" y="1690688"/>
-            <a:ext cx="7034213" cy="5039436"/>
-          </a:xfrm>
-          <a:prstGeom prst="rect">
-            <a:avLst/>
-          </a:prstGeom>
-        </p:spPr>
-      </p:pic>
-      <p:sp>
-        <p:nvSpPr>
-          <p:cNvPr id="5" name="Rechteck 4">
-            <a:extLst>
-              <a:ext uri="{FF2B5EF4-FFF2-40B4-BE49-F238E27FC236}">
-                <a16:creationId xmlns:a16="http://schemas.microsoft.com/office/drawing/2014/main" id="{964C4936-972C-8C49-8DE2-774DAC22DF93}"/>
-              </a:ext>
-            </a:extLst>
-          </p:cNvPr>
-          <p:cNvSpPr/>
-          <p:nvPr/>
-        </p:nvSpPr>
-        <p:spPr>
-          <a:xfrm>
-            <a:off x="8026400" y="1690688"/>
-            <a:ext cx="3911600" cy="5039436"/>
-          </a:xfrm>
-          <a:prstGeom prst="rect">
-            <a:avLst/>
-          </a:prstGeom>
-        </p:spPr>
-        <p:style>
-          <a:lnRef idx="2">
-            <a:schemeClr val="accent1">
-              <a:shade val="50000"/>
-            </a:schemeClr>
-          </a:lnRef>
-          <a:fillRef idx="1">
-            <a:schemeClr val="accent1"/>
-          </a:fillRef>
-          <a:effectRef idx="0">
-            <a:schemeClr val="accent1"/>
-          </a:effectRef>
-          <a:fontRef idx="minor">
-            <a:schemeClr val="lt1"/>
-          </a:fontRef>
-        </p:style>
-        <p:txBody>
-          <a:bodyPr rtlCol="0" anchor="ctr"/>
-          <a:lstStyle/>
-          <a:p>
-            <a:r>
-              <a:rPr lang="de-DE" dirty="0"/>
-              <a:t>Clean = löscht </a:t>
-            </a:r>
-            <a:r>
-              <a:rPr lang="de-DE" dirty="0" err="1"/>
-              <a:t>target</a:t>
-            </a:r>
+          <a:p>
+            <a:pPr marL="0" indent="0">
+              <a:buNone/>
+            </a:pPr>
+            <a:r>
+              <a:rPr lang="de-DE" dirty="0"/>
+              <a:t>Abhängigkeiten wegmachen die man nicht oder die von dritte Programm schon geliefert werden oder die Problem bereiten</a:t>
+            </a:r>
+          </a:p>
+          <a:p>
+            <a:pPr marL="0" indent="0">
+              <a:buNone/>
+            </a:pPr>
             <a:endParaRPr lang="de-DE" dirty="0"/>
-          </a:p>
-          <a:p>
-            <a:r>
-              <a:rPr lang="de-DE" dirty="0" err="1"/>
-              <a:t>Validate</a:t>
-            </a:r>
-            <a:r>
-              <a:rPr lang="de-DE" dirty="0"/>
-              <a:t>= </a:t>
-            </a:r>
-            <a:r>
-              <a:rPr lang="de-DE" dirty="0" err="1"/>
-              <a:t>überpruft</a:t>
-            </a:r>
-            <a:r>
-              <a:rPr lang="de-DE" dirty="0"/>
-              <a:t> ob </a:t>
-            </a:r>
-            <a:r>
-              <a:rPr lang="de-DE" dirty="0" err="1"/>
-              <a:t>java</a:t>
-            </a:r>
-            <a:r>
-              <a:rPr lang="de-DE" dirty="0"/>
-              <a:t> </a:t>
-            </a:r>
-            <a:r>
-              <a:rPr lang="de-DE" dirty="0" err="1"/>
-              <a:t>validierung</a:t>
-            </a:r>
-            <a:r>
-              <a:rPr lang="de-DE" dirty="0"/>
-              <a:t> richtig sind</a:t>
-            </a:r>
-          </a:p>
-          <a:p>
-            <a:r>
-              <a:rPr lang="de-DE" dirty="0" err="1"/>
-              <a:t>Compile</a:t>
-            </a:r>
-            <a:r>
-              <a:rPr lang="de-DE" dirty="0"/>
-              <a:t>= </a:t>
-            </a:r>
-            <a:r>
-              <a:rPr lang="de-DE" dirty="0" err="1"/>
-              <a:t>java</a:t>
-            </a:r>
-            <a:r>
-              <a:rPr lang="de-DE" dirty="0"/>
-              <a:t> </a:t>
-            </a:r>
-            <a:r>
-              <a:rPr lang="de-DE" dirty="0" err="1"/>
-              <a:t>code</a:t>
-            </a:r>
-            <a:r>
-              <a:rPr lang="de-DE" dirty="0"/>
-              <a:t> in </a:t>
-            </a:r>
-            <a:r>
-              <a:rPr lang="de-DE" dirty="0" err="1"/>
-              <a:t>machine</a:t>
-            </a:r>
-            <a:r>
-              <a:rPr lang="de-DE" dirty="0"/>
-              <a:t> </a:t>
-            </a:r>
-            <a:r>
-              <a:rPr lang="de-DE" dirty="0" err="1"/>
-              <a:t>code</a:t>
-            </a:r>
-            <a:r>
-              <a:rPr lang="de-DE" dirty="0"/>
-              <a:t> / </a:t>
-            </a:r>
-            <a:r>
-              <a:rPr lang="de-DE" dirty="0" err="1"/>
-              <a:t>binary</a:t>
-            </a:r>
-            <a:r>
-              <a:rPr lang="de-DE" dirty="0"/>
-              <a:t> oder .</a:t>
-            </a:r>
-            <a:r>
-              <a:rPr lang="de-DE" dirty="0" err="1"/>
-              <a:t>class</a:t>
-            </a:r>
-            <a:endParaRPr lang="de-DE" dirty="0"/>
-          </a:p>
-          <a:p>
-            <a:r>
-              <a:rPr lang="de-DE" dirty="0"/>
-              <a:t>Test = führt Test klasse aus</a:t>
-            </a:r>
-          </a:p>
-          <a:p>
-            <a:r>
-              <a:rPr lang="de-DE" dirty="0"/>
-              <a:t> </a:t>
-            </a:r>
-            <a:r>
-              <a:rPr lang="de-DE" dirty="0" err="1"/>
-              <a:t>package</a:t>
-            </a:r>
-            <a:r>
-              <a:rPr lang="de-DE" dirty="0"/>
-              <a:t> = komprimieren in </a:t>
-            </a:r>
-            <a:r>
-              <a:rPr lang="de-DE" dirty="0" err="1"/>
-              <a:t>jar</a:t>
-            </a:r>
-            <a:r>
-              <a:rPr lang="de-DE" dirty="0"/>
-              <a:t>/war/</a:t>
-            </a:r>
-            <a:r>
-              <a:rPr lang="de-DE" dirty="0" err="1"/>
-              <a:t>ear</a:t>
-            </a:r>
-            <a:endParaRPr lang="de-DE" dirty="0"/>
-          </a:p>
-          <a:p>
-            <a:r>
-              <a:rPr lang="de-DE" dirty="0" err="1"/>
-              <a:t>Verify</a:t>
-            </a:r>
-            <a:r>
-              <a:rPr lang="de-DE" dirty="0"/>
-              <a:t>=</a:t>
-            </a:r>
-          </a:p>
-          <a:p>
-            <a:r>
-              <a:rPr lang="de-DE" dirty="0" err="1"/>
-              <a:t>Install</a:t>
-            </a:r>
-            <a:r>
-              <a:rPr lang="de-DE" dirty="0"/>
-              <a:t> = komprimierte </a:t>
-            </a:r>
-            <a:r>
-              <a:rPr lang="de-DE" dirty="0" err="1"/>
-              <a:t>file</a:t>
-            </a:r>
-            <a:r>
-              <a:rPr lang="de-DE" dirty="0"/>
-              <a:t> in .m2 </a:t>
-            </a:r>
-            <a:r>
-              <a:rPr lang="de-DE" dirty="0" err="1"/>
-              <a:t>repo</a:t>
-            </a:r>
-            <a:r>
-              <a:rPr lang="de-DE" dirty="0"/>
-              <a:t> schieben</a:t>
-            </a:r>
-          </a:p>
-          <a:p>
-            <a:r>
-              <a:rPr lang="de-DE" dirty="0" err="1"/>
-              <a:t>Deploy</a:t>
-            </a:r>
-            <a:r>
-              <a:rPr lang="de-DE" dirty="0"/>
-              <a:t> = </a:t>
-            </a:r>
-            <a:r>
-              <a:rPr lang="de-DE" dirty="0" err="1"/>
-              <a:t>artifact</a:t>
-            </a:r>
-            <a:r>
-              <a:rPr lang="de-DE" dirty="0"/>
-              <a:t> in </a:t>
-            </a:r>
-            <a:r>
-              <a:rPr lang="de-DE" dirty="0" err="1"/>
-              <a:t>server</a:t>
-            </a:r>
-            <a:r>
-              <a:rPr lang="de-DE" dirty="0"/>
-              <a:t> hochladen</a:t>
-            </a:r>
           </a:p>
         </p:txBody>
       </p:sp>
     </p:spTree>
     <p:extLst>
       <p:ext uri="{BB962C8B-B14F-4D97-AF65-F5344CB8AC3E}">
-        <p14:creationId xmlns:p14="http://schemas.microsoft.com/office/powerpoint/2010/main" val="2448547759"/>
+        <p14:creationId xmlns:p14="http://schemas.microsoft.com/office/powerpoint/2010/main" val="2616373220"/>
       </p:ext>
     </p:extLst>
   </p:cSld>
@@ -5919,35 +5433,10 @@
       </p:grpSpPr>
       <p:sp>
         <p:nvSpPr>
-          <p:cNvPr id="2" name="Titel 1">
-            <a:extLst>
-              <a:ext uri="{FF2B5EF4-FFF2-40B4-BE49-F238E27FC236}">
-                <a16:creationId xmlns:a16="http://schemas.microsoft.com/office/drawing/2014/main" id="{1FF89E42-9F8D-2344-BDDA-F815A9B9255C}"/>
-              </a:ext>
-            </a:extLst>
-          </p:cNvPr>
-          <p:cNvSpPr>
-            <a:spLocks noGrp="1"/>
-          </p:cNvSpPr>
-          <p:nvPr>
-            <p:ph type="title"/>
-          </p:nvPr>
-        </p:nvSpPr>
-        <p:spPr/>
-        <p:txBody>
-          <a:bodyPr/>
-          <a:lstStyle/>
-          <a:p>
-            <a:endParaRPr lang="de-DE"/>
-          </a:p>
-        </p:txBody>
-      </p:sp>
-      <p:sp>
-        <p:nvSpPr>
           <p:cNvPr id="3" name="Inhaltsplatzhalter 2">
             <a:extLst>
               <a:ext uri="{FF2B5EF4-FFF2-40B4-BE49-F238E27FC236}">
-                <a16:creationId xmlns:a16="http://schemas.microsoft.com/office/drawing/2014/main" id="{BF72D7C3-63F1-734A-A673-C1319781D0C7}"/>
+                <a16:creationId xmlns:a16="http://schemas.microsoft.com/office/drawing/2014/main" id="{B3B159BF-BD0B-9746-9169-7A2A945971A5}"/>
               </a:ext>
             </a:extLst>
           </p:cNvPr>
@@ -5958,14 +5447,73 @@
             <p:ph idx="1"/>
           </p:nvPr>
         </p:nvSpPr>
-        <p:spPr/>
-        <p:txBody>
-          <a:bodyPr/>
-          <a:lstStyle/>
-          <a:p>
-            <a:r>
-              <a:rPr lang="de-DE" dirty="0"/>
-              <a:t>Wenn du eine </a:t>
+        <p:spPr>
+          <a:xfrm>
+            <a:off x="838200" y="1016000"/>
+            <a:ext cx="10515600" cy="5160963"/>
+          </a:xfrm>
+        </p:spPr>
+        <p:txBody>
+          <a:bodyPr/>
+          <a:lstStyle/>
+          <a:p>
+            <a:pPr marL="0" indent="0">
+              <a:buNone/>
+            </a:pPr>
+            <a:r>
+              <a:rPr lang="de-DE" b="1" dirty="0" err="1"/>
+              <a:t>Scope</a:t>
+            </a:r>
+            <a:r>
+              <a:rPr lang="de-DE" b="1" dirty="0"/>
+              <a:t> </a:t>
+            </a:r>
+          </a:p>
+          <a:p>
+            <a:pPr marL="0" indent="0">
+              <a:buNone/>
+            </a:pPr>
+            <a:r>
+              <a:rPr lang="de-DE" i="1" dirty="0"/>
+              <a:t>beschränkt die </a:t>
+            </a:r>
+            <a:r>
+              <a:rPr lang="de-DE" i="1" dirty="0" err="1"/>
+              <a:t>präsenz</a:t>
+            </a:r>
+            <a:r>
+              <a:rPr lang="de-DE" i="1" dirty="0"/>
+              <a:t> eines </a:t>
+            </a:r>
+            <a:r>
+              <a:rPr lang="de-DE" i="1" dirty="0" err="1"/>
+              <a:t>artifact</a:t>
+            </a:r>
+            <a:r>
+              <a:rPr lang="de-DE" i="1" dirty="0"/>
+              <a:t> </a:t>
+            </a:r>
+          </a:p>
+          <a:p>
+            <a:r>
+              <a:rPr lang="de-DE" dirty="0"/>
+              <a:t>Test = </a:t>
+            </a:r>
+            <a:r>
+              <a:rPr lang="de-DE" dirty="0" err="1"/>
+              <a:t>artifact.jar</a:t>
+            </a:r>
+            <a:r>
+              <a:rPr lang="de-DE" dirty="0"/>
+              <a:t> nur während </a:t>
+            </a:r>
+            <a:r>
+              <a:rPr lang="de-DE" dirty="0" err="1"/>
+              <a:t>test</a:t>
+            </a:r>
+            <a:r>
+              <a:rPr lang="de-DE" dirty="0"/>
+              <a:t> </a:t>
             </a:r>
             <a:r>
               <a:rPr lang="de-DE" dirty="0" err="1"/>
@@ -5973,60 +5521,79 @@
             </a:r>
             <a:r>
               <a:rPr lang="de-DE" dirty="0"/>
-              <a:t> ausführst dann werden die vorherige </a:t>
+              <a:t> präsent aber in </a:t>
+            </a:r>
+            <a:r>
+              <a:rPr lang="de-DE" dirty="0" err="1"/>
+              <a:t>deploy</a:t>
+            </a:r>
+            <a:r>
+              <a:rPr lang="de-DE" dirty="0"/>
+              <a:t> ober was auch nicht mehr in </a:t>
+            </a:r>
+            <a:r>
+              <a:rPr lang="de-DE" dirty="0" err="1"/>
+              <a:t>binary</a:t>
+            </a:r>
+            <a:endParaRPr lang="de-DE" dirty="0"/>
+          </a:p>
+          <a:p>
+            <a:r>
+              <a:rPr lang="de-DE" dirty="0" err="1"/>
+              <a:t>Provided</a:t>
+            </a:r>
+            <a:r>
+              <a:rPr lang="de-DE" dirty="0"/>
+              <a:t> = </a:t>
+            </a:r>
+            <a:r>
+              <a:rPr lang="de-DE" dirty="0" err="1"/>
+              <a:t>artifact.jar</a:t>
+            </a:r>
+            <a:r>
+              <a:rPr lang="de-DE" dirty="0"/>
+              <a:t> nur während </a:t>
+            </a:r>
+            <a:r>
+              <a:rPr lang="de-DE" dirty="0" err="1"/>
+              <a:t>compile</a:t>
+            </a:r>
+            <a:r>
+              <a:rPr lang="de-DE" dirty="0"/>
+              <a:t> und </a:t>
+            </a:r>
+            <a:r>
+              <a:rPr lang="de-DE" dirty="0" err="1"/>
+              <a:t>test</a:t>
+            </a:r>
+            <a:r>
+              <a:rPr lang="de-DE" dirty="0"/>
+              <a:t> </a:t>
+            </a:r>
+          </a:p>
+          <a:p>
+            <a:r>
+              <a:rPr lang="de-DE" dirty="0" err="1"/>
+              <a:t>Compile</a:t>
+            </a:r>
+            <a:r>
+              <a:rPr lang="de-DE" dirty="0"/>
+              <a:t> =  alle </a:t>
             </a:r>
             <a:r>
               <a:rPr lang="de-DE" dirty="0" err="1"/>
               <a:t>phase</a:t>
             </a:r>
-            <a:r>
-              <a:rPr lang="de-DE" dirty="0"/>
-              <a:t> mit ausgeführt.</a:t>
-            </a:r>
-          </a:p>
-          <a:p>
             <a:endParaRPr lang="de-DE" dirty="0"/>
           </a:p>
           <a:p>
             <a:r>
               <a:rPr lang="de-DE" dirty="0" err="1"/>
-              <a:t>mvn</a:t>
-            </a:r>
-            <a:r>
-              <a:rPr lang="de-DE" dirty="0"/>
-              <a:t> </a:t>
-            </a:r>
-            <a:r>
-              <a:rPr lang="de-DE" dirty="0" err="1"/>
-              <a:t>package</a:t>
-            </a:r>
-            <a:r>
-              <a:rPr lang="de-DE" dirty="0"/>
-              <a:t> =&gt;  </a:t>
-            </a:r>
-            <a:r>
-              <a:rPr lang="de-DE" dirty="0" err="1"/>
-              <a:t>mvn</a:t>
-            </a:r>
-            <a:r>
-              <a:rPr lang="de-DE" dirty="0"/>
-              <a:t> </a:t>
-            </a:r>
-            <a:r>
-              <a:rPr lang="de-DE" dirty="0" err="1"/>
-              <a:t>validate</a:t>
-            </a:r>
-            <a:r>
-              <a:rPr lang="de-DE" dirty="0"/>
-              <a:t> + </a:t>
-            </a:r>
-            <a:r>
-              <a:rPr lang="de-DE" dirty="0" err="1"/>
-              <a:t>compile</a:t>
-            </a:r>
-            <a:r>
-              <a:rPr lang="de-DE" dirty="0"/>
-              <a:t> + (</a:t>
+              <a:t>Runtime</a:t>
+            </a:r>
+            <a:r>
+              <a:rPr lang="de-DE" dirty="0"/>
+              <a:t> = </a:t>
             </a:r>
             <a:r>
               <a:rPr lang="de-DE" dirty="0" err="1"/>
@@ -6034,12 +5601,15 @@
             </a:r>
             <a:r>
               <a:rPr lang="de-DE" dirty="0"/>
-              <a:t>) und dann </a:t>
-            </a:r>
-            <a:r>
-              <a:rPr lang="de-DE" dirty="0" err="1"/>
-              <a:t>package</a:t>
-            </a:r>
+              <a:t> und </a:t>
+            </a:r>
+            <a:r>
+              <a:rPr lang="de-DE" dirty="0" err="1"/>
+              <a:t>production</a:t>
+            </a:r>
+            <a:endParaRPr lang="de-DE" dirty="0"/>
+          </a:p>
+          <a:p>
             <a:endParaRPr lang="de-DE" dirty="0"/>
           </a:p>
         </p:txBody>
@@ -6047,7 +5617,7 @@
     </p:spTree>
     <p:extLst>
       <p:ext uri="{BB962C8B-B14F-4D97-AF65-F5344CB8AC3E}">
-        <p14:creationId xmlns:p14="http://schemas.microsoft.com/office/powerpoint/2010/main" val="1820818777"/>
+        <p14:creationId xmlns:p14="http://schemas.microsoft.com/office/powerpoint/2010/main" val="3602108803"/>
       </p:ext>
     </p:extLst>
   </p:cSld>
@@ -6079,7 +5649,7 @@
           <p:cNvPr id="2" name="Titel 1">
             <a:extLst>
               <a:ext uri="{FF2B5EF4-FFF2-40B4-BE49-F238E27FC236}">
-                <a16:creationId xmlns:a16="http://schemas.microsoft.com/office/drawing/2014/main" id="{B75ED0FA-1381-A947-982D-11CF54EAC611}"/>
+                <a16:creationId xmlns:a16="http://schemas.microsoft.com/office/drawing/2014/main" id="{B0FEF358-39DC-1347-8A0D-52157BA51A65}"/>
               </a:ext>
             </a:extLst>
           </p:cNvPr>
@@ -6095,9 +5665,46 @@
           <a:bodyPr/>
           <a:lstStyle/>
           <a:p>
-            <a:r>
-              <a:rPr lang="de-DE" dirty="0" err="1"/>
-              <a:t>Dependency</a:t>
+            <a:endParaRPr lang="de-DE"/>
+          </a:p>
+        </p:txBody>
+      </p:sp>
+      <p:sp>
+        <p:nvSpPr>
+          <p:cNvPr id="3" name="Inhaltsplatzhalter 2">
+            <a:extLst>
+              <a:ext uri="{FF2B5EF4-FFF2-40B4-BE49-F238E27FC236}">
+                <a16:creationId xmlns:a16="http://schemas.microsoft.com/office/drawing/2014/main" id="{9EC6270F-7ED1-744A-8116-9FCE5D524585}"/>
+              </a:ext>
+            </a:extLst>
+          </p:cNvPr>
+          <p:cNvSpPr>
+            <a:spLocks noGrp="1"/>
+          </p:cNvSpPr>
+          <p:nvPr>
+            <p:ph idx="1"/>
+          </p:nvPr>
+        </p:nvSpPr>
+        <p:spPr/>
+        <p:txBody>
+          <a:bodyPr/>
+          <a:lstStyle/>
+          <a:p>
+            <a:r>
+              <a:rPr lang="de-DE" dirty="0"/>
+              <a:t>Wenn </a:t>
+            </a:r>
+            <a:r>
+              <a:rPr lang="de-DE" dirty="0" err="1"/>
+              <a:t>artifact</a:t>
+            </a:r>
+            <a:r>
+              <a:rPr lang="de-DE" dirty="0"/>
+              <a:t> im </a:t>
+            </a:r>
+            <a:r>
+              <a:rPr lang="de-DE" dirty="0" err="1"/>
+              <a:t>pom</a:t>
             </a:r>
             <a:r>
               <a:rPr lang="de-DE" dirty="0"/>
@@ -6105,41 +5712,50 @@
             </a:r>
             <a:r>
               <a:rPr lang="de-DE" dirty="0" err="1"/>
-              <a:t>mechanismus</a:t>
+              <a:t>problem</a:t>
+            </a:r>
+            <a:r>
+              <a:rPr lang="de-DE" dirty="0"/>
+              <a:t> hat =&gt; in –m2 </a:t>
+            </a:r>
+            <a:r>
+              <a:rPr lang="de-DE" dirty="0" err="1"/>
+              <a:t>shauen</a:t>
+            </a:r>
+            <a:r>
+              <a:rPr lang="de-DE" dirty="0"/>
+              <a:t> ob alles ok </a:t>
+            </a:r>
+            <a:r>
+              <a:rPr lang="de-DE" dirty="0" err="1"/>
+              <a:t>is</a:t>
             </a:r>
             <a:endParaRPr lang="de-DE" dirty="0"/>
           </a:p>
-        </p:txBody>
-      </p:sp>
-      <p:sp>
-        <p:nvSpPr>
-          <p:cNvPr id="3" name="Inhaltsplatzhalter 2">
-            <a:extLst>
-              <a:ext uri="{FF2B5EF4-FFF2-40B4-BE49-F238E27FC236}">
-                <a16:creationId xmlns:a16="http://schemas.microsoft.com/office/drawing/2014/main" id="{907A0DF3-A657-FF46-8E60-0F50D4BACABE}"/>
-              </a:ext>
-            </a:extLst>
-          </p:cNvPr>
-          <p:cNvSpPr>
-            <a:spLocks noGrp="1"/>
-          </p:cNvSpPr>
-          <p:nvPr>
-            <p:ph idx="1"/>
-          </p:nvPr>
-        </p:nvSpPr>
-        <p:spPr/>
-        <p:txBody>
-          <a:bodyPr>
-            <a:normAutofit fontScale="85000" lnSpcReduction="20000"/>
-          </a:bodyPr>
-          <a:lstStyle/>
-          <a:p>
-            <a:pPr marL="0" indent="0">
-              <a:buNone/>
-            </a:pPr>
-            <a:r>
-              <a:rPr lang="de-DE" dirty="0" err="1"/>
-              <a:t>Dependency</a:t>
+          <a:p>
+            <a:r>
+              <a:rPr lang="de-DE" dirty="0"/>
+              <a:t>Wenn in .m2 etwas fehlt dann komplett </a:t>
+            </a:r>
+            <a:r>
+              <a:rPr lang="de-DE" dirty="0" err="1"/>
+              <a:t>artifact</a:t>
+            </a:r>
+            <a:r>
+              <a:rPr lang="de-DE" dirty="0"/>
+              <a:t> und sein </a:t>
+            </a:r>
+            <a:r>
+              <a:rPr lang="de-DE" dirty="0" err="1"/>
+              <a:t>ordner</a:t>
+            </a:r>
+            <a:r>
+              <a:rPr lang="de-DE" dirty="0"/>
+              <a:t> löschen und mit </a:t>
+            </a:r>
+            <a:r>
+              <a:rPr lang="de-DE" dirty="0" err="1"/>
+              <a:t>mvn</a:t>
             </a:r>
             <a:r>
               <a:rPr lang="de-DE" dirty="0"/>
@@ -6147,188 +5763,22 @@
             </a:r>
             <a:r>
               <a:rPr lang="de-DE" dirty="0" err="1"/>
-              <a:t>configurieren</a:t>
-            </a:r>
-            <a:endParaRPr lang="de-DE" dirty="0"/>
-          </a:p>
-          <a:p>
-            <a:pPr marL="0" indent="0">
-              <a:buNone/>
-            </a:pPr>
-            <a:r>
-              <a:rPr lang="de-DE" dirty="0"/>
-              <a:t>&lt;</a:t>
-            </a:r>
-            <a:r>
-              <a:rPr lang="de-DE" dirty="0" err="1"/>
-              <a:t>dependency</a:t>
-            </a:r>
-            <a:r>
-              <a:rPr lang="de-DE" dirty="0"/>
-              <a:t>&gt;</a:t>
-            </a:r>
-            <a:br>
-              <a:rPr lang="de-DE" dirty="0"/>
-            </a:br>
-            <a:r>
-              <a:rPr lang="de-DE" dirty="0"/>
-              <a:t>    &lt;</a:t>
-            </a:r>
-            <a:r>
-              <a:rPr lang="de-DE" dirty="0" err="1"/>
-              <a:t>groupId</a:t>
-            </a:r>
-            <a:r>
-              <a:rPr lang="de-DE" dirty="0"/>
-              <a:t>&gt;</a:t>
-            </a:r>
-            <a:r>
-              <a:rPr lang="de-DE" dirty="0" err="1"/>
-              <a:t>org.junit.jupiter</a:t>
-            </a:r>
-            <a:r>
-              <a:rPr lang="de-DE" dirty="0"/>
-              <a:t>&lt;/</a:t>
-            </a:r>
-            <a:r>
-              <a:rPr lang="de-DE" dirty="0" err="1"/>
-              <a:t>groupId</a:t>
-            </a:r>
-            <a:r>
-              <a:rPr lang="de-DE" dirty="0"/>
-              <a:t>&gt;</a:t>
-            </a:r>
-            <a:br>
-              <a:rPr lang="de-DE" dirty="0"/>
-            </a:br>
-            <a:r>
-              <a:rPr lang="de-DE" dirty="0"/>
-              <a:t>    &lt;</a:t>
-            </a:r>
-            <a:r>
-              <a:rPr lang="de-DE" dirty="0" err="1"/>
-              <a:t>artifactId</a:t>
-            </a:r>
-            <a:r>
-              <a:rPr lang="de-DE" dirty="0"/>
-              <a:t>&gt;</a:t>
-            </a:r>
-            <a:r>
-              <a:rPr lang="de-DE" dirty="0" err="1"/>
-              <a:t>junit</a:t>
-            </a:r>
-            <a:r>
-              <a:rPr lang="de-DE" dirty="0"/>
-              <a:t>-jupiter&lt;/</a:t>
-            </a:r>
-            <a:r>
-              <a:rPr lang="de-DE" dirty="0" err="1"/>
-              <a:t>artifactId</a:t>
-            </a:r>
-            <a:r>
-              <a:rPr lang="de-DE" dirty="0"/>
-              <a:t>&gt;</a:t>
-            </a:r>
-            <a:br>
-              <a:rPr lang="de-DE" dirty="0"/>
-            </a:br>
-            <a:r>
-              <a:rPr lang="de-DE" dirty="0"/>
-              <a:t>    &lt;</a:t>
-            </a:r>
-            <a:r>
-              <a:rPr lang="de-DE" dirty="0" err="1"/>
-              <a:t>version</a:t>
-            </a:r>
-            <a:r>
-              <a:rPr lang="de-DE" dirty="0"/>
-              <a:t>&gt;5.4.2&lt;/</a:t>
-            </a:r>
-            <a:r>
-              <a:rPr lang="de-DE" dirty="0" err="1"/>
-              <a:t>version</a:t>
-            </a:r>
-            <a:r>
-              <a:rPr lang="de-DE" dirty="0"/>
-              <a:t>&gt;</a:t>
-            </a:r>
-            <a:br>
-              <a:rPr lang="de-DE" dirty="0"/>
-            </a:br>
-            <a:r>
-              <a:rPr lang="de-DE" dirty="0"/>
-              <a:t>&lt;/</a:t>
-            </a:r>
-            <a:r>
-              <a:rPr lang="de-DE" dirty="0" err="1"/>
-              <a:t>dependency</a:t>
-            </a:r>
-            <a:r>
-              <a:rPr lang="de-DE" dirty="0"/>
-              <a:t>&gt;</a:t>
-            </a:r>
-          </a:p>
-          <a:p>
-            <a:endParaRPr lang="de-DE" dirty="0"/>
-          </a:p>
-          <a:p>
-            <a:pPr marL="0" indent="0">
-              <a:buNone/>
-            </a:pPr>
-            <a:r>
-              <a:rPr lang="de-DE" b="1" dirty="0"/>
-              <a:t>Transitivität</a:t>
-            </a:r>
-          </a:p>
-          <a:p>
-            <a:pPr marL="0" indent="0">
-              <a:buNone/>
-            </a:pPr>
-            <a:r>
-              <a:rPr lang="de-DE" dirty="0" err="1"/>
-              <a:t>Mvn</a:t>
-            </a:r>
-            <a:r>
-              <a:rPr lang="de-DE" dirty="0"/>
-              <a:t> holt gewünschte </a:t>
-            </a:r>
-            <a:r>
-              <a:rPr lang="de-DE" dirty="0" err="1"/>
-              <a:t>libray</a:t>
-            </a:r>
-            <a:r>
-              <a:rPr lang="de-DE" dirty="0"/>
-              <a:t> plus </a:t>
-            </a:r>
-            <a:r>
-              <a:rPr lang="de-DE" dirty="0" err="1"/>
-              <a:t>abhängigkeiten</a:t>
-            </a:r>
-            <a:endParaRPr lang="de-DE" dirty="0"/>
-          </a:p>
-          <a:p>
-            <a:pPr marL="0" indent="0">
-              <a:buNone/>
-            </a:pPr>
-            <a:r>
-              <a:rPr lang="de-DE" b="1" dirty="0" err="1"/>
-              <a:t>Exclusion</a:t>
-            </a:r>
-            <a:endParaRPr lang="de-DE" b="1" dirty="0"/>
-          </a:p>
-          <a:p>
-            <a:pPr marL="0" indent="0">
-              <a:buNone/>
-            </a:pPr>
-            <a:r>
-              <a:rPr lang="de-DE" dirty="0"/>
-              <a:t>Abhängigkeiten wegmachen die man nicht oder die von dritte Programm schon geliefert werden oder die Problem bereiten</a:t>
-            </a:r>
-          </a:p>
-          <a:p>
-            <a:pPr marL="0" indent="0">
-              <a:buNone/>
-            </a:pPr>
+              <a:t>artifact</a:t>
+            </a:r>
+            <a:r>
+              <a:rPr lang="de-DE" dirty="0"/>
+              <a:t> von </a:t>
+            </a:r>
+            <a:r>
+              <a:rPr lang="de-DE" dirty="0" err="1"/>
+              <a:t>nexus</a:t>
+            </a:r>
+            <a:r>
+              <a:rPr lang="de-DE" dirty="0"/>
+              <a:t> erneut holen</a:t>
+            </a:r>
+          </a:p>
+          <a:p>
             <a:endParaRPr lang="de-DE" dirty="0"/>
           </a:p>
         </p:txBody>
@@ -6336,7 +5786,7 @@
     </p:spTree>
     <p:extLst>
       <p:ext uri="{BB962C8B-B14F-4D97-AF65-F5344CB8AC3E}">
-        <p14:creationId xmlns:p14="http://schemas.microsoft.com/office/powerpoint/2010/main" val="2616373220"/>
+        <p14:creationId xmlns:p14="http://schemas.microsoft.com/office/powerpoint/2010/main" val="3487494916"/>
       </p:ext>
     </p:extLst>
   </p:cSld>

</xml_diff>